<commit_message>
gain and phase margins
</commit_message>
<xml_diff>
--- a/slides/4_stability.pptx
+++ b/slides/4_stability.pptx
@@ -5,7 +5,7 @@
     <p:sldMasterId id="2147483648" r:id="rId1"/>
   </p:sldMasterIdLst>
   <p:notesMasterIdLst>
-    <p:notesMasterId r:id="rId20"/>
+    <p:notesMasterId r:id="rId23"/>
   </p:notesMasterIdLst>
   <p:sldIdLst>
     <p:sldId id="256" r:id="rId2"/>
@@ -24,8 +24,11 @@
     <p:sldId id="270" r:id="rId15"/>
     <p:sldId id="300" r:id="rId16"/>
     <p:sldId id="273" r:id="rId17"/>
-    <p:sldId id="274" r:id="rId18"/>
-    <p:sldId id="275" r:id="rId19"/>
+    <p:sldId id="301" r:id="rId18"/>
+    <p:sldId id="274" r:id="rId19"/>
+    <p:sldId id="302" r:id="rId20"/>
+    <p:sldId id="275" r:id="rId21"/>
+    <p:sldId id="303" r:id="rId22"/>
   </p:sldIdLst>
   <p:sldSz cx="12192000" cy="6858000"/>
   <p:notesSz cx="6858000" cy="9144000"/>
@@ -496,7 +499,7 @@
           <a:p>
             <a:fld id="{506E0FD1-891F-4B1E-916D-E9B585160BB8}" type="datetimeFigureOut">
               <a:rPr lang="en-GB" smtClean="0"/>
-              <a:t>18/02/2026</a:t>
+              <a:t>20/02/2026</a:t>
             </a:fld>
             <a:endParaRPr lang="en-GB"/>
           </a:p>
@@ -913,7 +916,7 @@
           <a:p>
             <a:fld id="{D68C3F22-27B2-44E3-9C5F-D08126455F6F}" type="datetime1">
               <a:rPr lang="en-GB" smtClean="0"/>
-              <a:t>18/02/2026</a:t>
+              <a:t>20/02/2026</a:t>
             </a:fld>
             <a:endParaRPr lang="en-GB"/>
           </a:p>
@@ -1113,7 +1116,7 @@
           <a:p>
             <a:fld id="{1CD03846-7BF6-4FB6-A921-FF3379ADBD4C}" type="datetime1">
               <a:rPr lang="en-GB" smtClean="0"/>
-              <a:t>18/02/2026</a:t>
+              <a:t>20/02/2026</a:t>
             </a:fld>
             <a:endParaRPr lang="en-GB"/>
           </a:p>
@@ -1323,7 +1326,7 @@
           <a:p>
             <a:fld id="{99E1B91A-3FD0-4144-9C84-63E9688ED2FE}" type="datetime1">
               <a:rPr lang="en-GB" smtClean="0"/>
-              <a:t>18/02/2026</a:t>
+              <a:t>20/02/2026</a:t>
             </a:fld>
             <a:endParaRPr lang="en-GB"/>
           </a:p>
@@ -1523,7 +1526,7 @@
           <a:p>
             <a:fld id="{5295ED7B-FEAD-4734-819F-93EF4B0EA908}" type="datetime1">
               <a:rPr lang="en-GB" smtClean="0"/>
-              <a:t>18/02/2026</a:t>
+              <a:t>20/02/2026</a:t>
             </a:fld>
             <a:endParaRPr lang="en-GB"/>
           </a:p>
@@ -1799,7 +1802,7 @@
           <a:p>
             <a:fld id="{D2D5D4B4-C926-4B45-8815-1ED8911179A2}" type="datetime1">
               <a:rPr lang="en-GB" smtClean="0"/>
-              <a:t>18/02/2026</a:t>
+              <a:t>20/02/2026</a:t>
             </a:fld>
             <a:endParaRPr lang="en-GB"/>
           </a:p>
@@ -2067,7 +2070,7 @@
           <a:p>
             <a:fld id="{B4C5210A-0E37-4935-93AF-69F21A5F712F}" type="datetime1">
               <a:rPr lang="en-GB" smtClean="0"/>
-              <a:t>18/02/2026</a:t>
+              <a:t>20/02/2026</a:t>
             </a:fld>
             <a:endParaRPr lang="en-GB"/>
           </a:p>
@@ -2482,7 +2485,7 @@
           <a:p>
             <a:fld id="{3D3A6B2F-436C-4691-80E8-9C890E000E9D}" type="datetime1">
               <a:rPr lang="en-GB" smtClean="0"/>
-              <a:t>18/02/2026</a:t>
+              <a:t>20/02/2026</a:t>
             </a:fld>
             <a:endParaRPr lang="en-GB"/>
           </a:p>
@@ -2624,7 +2627,7 @@
           <a:p>
             <a:fld id="{84385F4C-D74B-496F-8D21-97E3549C783B}" type="datetime1">
               <a:rPr lang="en-GB" smtClean="0"/>
-              <a:t>18/02/2026</a:t>
+              <a:t>20/02/2026</a:t>
             </a:fld>
             <a:endParaRPr lang="en-GB"/>
           </a:p>
@@ -2737,7 +2740,7 @@
           <a:p>
             <a:fld id="{0CBDCB32-C241-4703-A832-4EB47BD54E83}" type="datetime1">
               <a:rPr lang="en-GB" smtClean="0"/>
-              <a:t>18/02/2026</a:t>
+              <a:t>20/02/2026</a:t>
             </a:fld>
             <a:endParaRPr lang="en-GB"/>
           </a:p>
@@ -3050,7 +3053,7 @@
           <a:p>
             <a:fld id="{85C150FF-BE95-4D25-A16A-E368A81CBF24}" type="datetime1">
               <a:rPr lang="en-GB" smtClean="0"/>
-              <a:t>18/02/2026</a:t>
+              <a:t>20/02/2026</a:t>
             </a:fld>
             <a:endParaRPr lang="en-GB"/>
           </a:p>
@@ -3339,7 +3342,7 @@
           <a:p>
             <a:fld id="{F3C5DB4B-B349-43C9-A424-BADA723AD9F1}" type="datetime1">
               <a:rPr lang="en-GB" smtClean="0"/>
-              <a:t>18/02/2026</a:t>
+              <a:t>20/02/2026</a:t>
             </a:fld>
             <a:endParaRPr lang="en-GB"/>
           </a:p>
@@ -3582,7 +3585,7 @@
           <a:p>
             <a:fld id="{12632426-0A0C-405F-A3D0-2D11AA44702A}" type="datetime1">
               <a:rPr lang="en-GB" smtClean="0"/>
-              <a:t>18/02/2026</a:t>
+              <a:t>20/02/2026</a:t>
             </a:fld>
             <a:endParaRPr lang="en-GB"/>
           </a:p>
@@ -6663,38 +6666,34 @@
                 </a:r>
                 <a:r>
                   <a:rPr lang="de-DE" sz="2600" dirty="0" err="1"/>
-                  <a:t>n</a:t>
-                </a:r>
-                <a:r>
-                  <a:rPr lang="de-DE" sz="2400" dirty="0" err="1"/>
-                  <a:t>o</a:t>
-                </a:r>
-                <a:r>
-                  <a:rPr lang="de-DE" sz="2400" dirty="0"/>
-                  <a:t> </a:t>
-                </a:r>
-                <a:r>
-                  <a:rPr lang="de-DE" sz="2400" dirty="0" err="1"/>
+                  <a:t>no</a:t>
+                </a:r>
+                <a:r>
+                  <a:rPr lang="de-DE" sz="2600" dirty="0"/>
+                  <a:t> </a:t>
+                </a:r>
+                <a:r>
+                  <a:rPr lang="de-DE" sz="2600" dirty="0" err="1"/>
                   <a:t>mathematical</a:t>
                 </a:r>
                 <a:r>
-                  <a:rPr lang="de-DE" sz="2400" dirty="0"/>
-                  <a:t> </a:t>
-                </a:r>
-                <a:r>
-                  <a:rPr lang="de-DE" sz="2400" dirty="0" err="1"/>
+                  <a:rPr lang="de-DE" sz="2600" dirty="0"/>
+                  <a:t> </a:t>
+                </a:r>
+                <a:r>
+                  <a:rPr lang="de-DE" sz="2600" dirty="0" err="1"/>
                   <a:t>model</a:t>
                 </a:r>
                 <a:r>
-                  <a:rPr lang="de-DE" sz="2400" dirty="0"/>
-                  <a:t> </a:t>
-                </a:r>
-                <a:r>
-                  <a:rPr lang="de-DE" sz="2400" dirty="0" err="1"/>
+                  <a:rPr lang="de-DE" sz="2600" dirty="0"/>
+                  <a:t> </a:t>
+                </a:r>
+                <a:r>
+                  <a:rPr lang="de-DE" sz="2600" dirty="0" err="1"/>
                   <a:t>needed</a:t>
                 </a:r>
                 <a:r>
-                  <a:rPr lang="de-DE" sz="2400" dirty="0"/>
+                  <a:rPr lang="de-DE" sz="2600" dirty="0"/>
                   <a:t>, </a:t>
                 </a:r>
                 <a:r>
@@ -6814,6 +6813,12 @@
                 <a:pPr marL="0" indent="0">
                   <a:buNone/>
                 </a:pPr>
+                <a:endParaRPr lang="de-DE" sz="2600" dirty="0"/>
+              </a:p>
+              <a:p>
+                <a:pPr marL="0" indent="0">
+                  <a:buNone/>
+                </a:pPr>
                 <a:r>
                   <a:rPr lang="de-DE" sz="2600" dirty="0" err="1"/>
                   <a:t>Now</a:t>
@@ -6860,7 +6865,64 @@
                 </a:r>
                 <a:r>
                   <a:rPr lang="de-DE" sz="2600" dirty="0"/>
-                  <a:t>)</a:t>
+                  <a:t>):</a:t>
+                </a:r>
+              </a:p>
+              <a:p>
+                <a:pPr marL="0" indent="0">
+                  <a:buNone/>
+                </a:pPr>
+                <a:r>
+                  <a:rPr lang="de-DE" sz="2600" dirty="0"/>
+                  <a:t>Given an open-loop </a:t>
+                </a:r>
+                <a:r>
+                  <a:rPr lang="de-DE" sz="2600" dirty="0" err="1"/>
+                  <a:t>transfer</a:t>
+                </a:r>
+                <a:r>
+                  <a:rPr lang="de-DE" sz="2600" dirty="0"/>
+                  <a:t> </a:t>
+                </a:r>
+                <a:r>
+                  <a:rPr lang="de-DE" sz="2600" dirty="0" err="1"/>
+                  <a:t>function</a:t>
+                </a:r>
+                <a:r>
+                  <a:rPr lang="de-DE" sz="2600" dirty="0"/>
+                  <a:t>, </a:t>
+                </a:r>
+                <a:r>
+                  <a:rPr lang="de-DE" sz="2600" dirty="0" err="1"/>
+                  <a:t>is</a:t>
+                </a:r>
+                <a:r>
+                  <a:rPr lang="de-DE" sz="2600" dirty="0"/>
+                  <a:t> </a:t>
+                </a:r>
+                <a:r>
+                  <a:rPr lang="de-DE" sz="2600" dirty="0" err="1"/>
+                  <a:t>the</a:t>
+                </a:r>
+                <a:r>
+                  <a:rPr lang="de-DE" sz="2600" dirty="0"/>
+                  <a:t> </a:t>
+                </a:r>
+                <a:r>
+                  <a:rPr lang="de-DE" sz="2600" dirty="0" err="1"/>
+                  <a:t>closed</a:t>
+                </a:r>
+                <a:r>
+                  <a:rPr lang="de-DE" sz="2600" dirty="0"/>
+                  <a:t> loop </a:t>
+                </a:r>
+                <a:r>
+                  <a:rPr lang="de-DE" sz="2600" dirty="0" err="1"/>
+                  <a:t>stable</a:t>
+                </a:r>
+                <a:r>
+                  <a:rPr lang="de-DE" sz="2600" dirty="0"/>
+                  <a:t>?</a:t>
                 </a:r>
               </a:p>
             </p:txBody>
@@ -6970,7 +7032,7 @@
           <p:cNvPr id="2" name="Titel 1">
             <a:extLst>
               <a:ext uri="{FF2B5EF4-FFF2-40B4-BE49-F238E27FC236}">
-                <a16:creationId xmlns:a16="http://schemas.microsoft.com/office/drawing/2014/main" id="{2A122470-E3B4-6307-0EA5-F1B7F554835F}"/>
+                <a16:creationId xmlns:a16="http://schemas.microsoft.com/office/drawing/2014/main" id="{7AC9ED36-91BE-6966-D5EF-6F327905D39B}"/>
               </a:ext>
             </a:extLst>
           </p:cNvPr>
@@ -6988,133 +7050,557 @@
           <a:p>
             <a:r>
               <a:rPr lang="de-DE" dirty="0" err="1"/>
-              <a:t>Nyquist</a:t>
+              <a:t>Closed</a:t>
             </a:r>
             <a:r>
               <a:rPr lang="de-DE" dirty="0"/>
-              <a:t> </a:t>
+              <a:t>-Loop </a:t>
             </a:r>
             <a:r>
               <a:rPr lang="de-DE" dirty="0" err="1"/>
-              <a:t>Criterion</a:t>
+              <a:t>Stability</a:t>
             </a:r>
             <a:endParaRPr lang="de-DE" dirty="0"/>
           </a:p>
         </p:txBody>
       </p:sp>
-      <p:sp>
-        <p:nvSpPr>
-          <p:cNvPr id="3" name="Inhaltsplatzhalter 2">
-            <a:extLst>
-              <a:ext uri="{FF2B5EF4-FFF2-40B4-BE49-F238E27FC236}">
-                <a16:creationId xmlns:a16="http://schemas.microsoft.com/office/drawing/2014/main" id="{C52AFC97-0C0F-D7E6-966D-ED72FE114700}"/>
-              </a:ext>
-            </a:extLst>
-          </p:cNvPr>
-          <p:cNvSpPr>
-            <a:spLocks noGrp="1"/>
-          </p:cNvSpPr>
-          <p:nvPr>
-            <p:ph idx="1"/>
-          </p:nvPr>
-        </p:nvSpPr>
-        <p:spPr/>
-        <p:txBody>
-          <a:bodyPr/>
-          <a:lstStyle/>
-          <a:p>
-            <a:r>
-              <a:rPr lang="de-DE" dirty="0" err="1"/>
-              <a:t>Encirclement</a:t>
-            </a:r>
-            <a:r>
-              <a:rPr lang="de-DE" dirty="0"/>
-              <a:t> </a:t>
-            </a:r>
-            <a:r>
-              <a:rPr lang="de-DE" dirty="0" err="1"/>
-              <a:t>of</a:t>
-            </a:r>
-            <a:r>
-              <a:rPr lang="de-DE" dirty="0"/>
-              <a:t> </a:t>
-            </a:r>
-            <a:r>
-              <a:rPr lang="de-DE" dirty="0" err="1"/>
-              <a:t>critical</a:t>
-            </a:r>
-            <a:r>
-              <a:rPr lang="de-DE" dirty="0"/>
-              <a:t> </a:t>
-            </a:r>
-            <a:r>
-              <a:rPr lang="de-DE" dirty="0" err="1"/>
-              <a:t>point</a:t>
-            </a:r>
-            <a:endParaRPr lang="de-DE" dirty="0"/>
-          </a:p>
-          <a:p>
-            <a:r>
-              <a:rPr lang="de-DE" dirty="0"/>
-              <a:t>Links </a:t>
-            </a:r>
-            <a:r>
-              <a:rPr lang="de-DE" dirty="0" err="1"/>
-              <a:t>frequency</a:t>
-            </a:r>
-            <a:r>
-              <a:rPr lang="de-DE" dirty="0"/>
-              <a:t> </a:t>
-            </a:r>
-            <a:r>
-              <a:rPr lang="de-DE" dirty="0" err="1"/>
-              <a:t>response</a:t>
-            </a:r>
-            <a:r>
-              <a:rPr lang="de-DE" dirty="0"/>
-              <a:t> </a:t>
-            </a:r>
-            <a:r>
-              <a:rPr lang="de-DE" dirty="0" err="1"/>
-              <a:t>to</a:t>
-            </a:r>
-            <a:r>
-              <a:rPr lang="de-DE" dirty="0"/>
-              <a:t> </a:t>
-            </a:r>
-            <a:r>
-              <a:rPr lang="de-DE" dirty="0" err="1"/>
-              <a:t>stability</a:t>
-            </a:r>
-            <a:endParaRPr lang="de-DE" dirty="0"/>
-          </a:p>
-          <a:p>
-            <a:r>
-              <a:rPr lang="de-DE" dirty="0"/>
-              <a:t>Powerful but </a:t>
-            </a:r>
-            <a:r>
-              <a:rPr lang="de-DE" dirty="0" err="1"/>
-              <a:t>conceptually</a:t>
-            </a:r>
-            <a:r>
-              <a:rPr lang="de-DE" dirty="0"/>
-              <a:t> </a:t>
-            </a:r>
-            <a:r>
-              <a:rPr lang="de-DE" dirty="0" err="1"/>
-              <a:t>challenging</a:t>
-            </a:r>
-            <a:endParaRPr lang="de-DE" dirty="0"/>
-          </a:p>
-        </p:txBody>
-      </p:sp>
+      <mc:AlternateContent xmlns:mc="http://schemas.openxmlformats.org/markup-compatibility/2006">
+        <mc:Choice xmlns:a14="http://schemas.microsoft.com/office/drawing/2010/main" Requires="a14">
+          <p:sp>
+            <p:nvSpPr>
+              <p:cNvPr id="3" name="Inhaltsplatzhalter 2">
+                <a:extLst>
+                  <a:ext uri="{FF2B5EF4-FFF2-40B4-BE49-F238E27FC236}">
+                    <a16:creationId xmlns:a16="http://schemas.microsoft.com/office/drawing/2014/main" id="{35D72C74-EA2A-7E93-E737-35EBB0F1C4CD}"/>
+                  </a:ext>
+                </a:extLst>
+              </p:cNvPr>
+              <p:cNvSpPr>
+                <a:spLocks noGrp="1"/>
+              </p:cNvSpPr>
+              <p:nvPr>
+                <p:ph idx="1"/>
+              </p:nvPr>
+            </p:nvSpPr>
+            <p:spPr/>
+            <p:txBody>
+              <a:bodyPr>
+                <a:normAutofit/>
+              </a:bodyPr>
+              <a:lstStyle/>
+              <a:p>
+                <a:pPr marL="0" indent="0">
+                  <a:buNone/>
+                </a:pPr>
+                <a:r>
+                  <a:rPr lang="de-DE" dirty="0"/>
+                  <a:t>Given an open-loop </a:t>
+                </a:r>
+                <a:r>
+                  <a:rPr lang="de-DE" dirty="0" err="1"/>
+                  <a:t>transfer</a:t>
+                </a:r>
+                <a:r>
+                  <a:rPr lang="de-DE" dirty="0"/>
+                  <a:t> </a:t>
+                </a:r>
+                <a:r>
+                  <a:rPr lang="de-DE" dirty="0" err="1"/>
+                  <a:t>function</a:t>
+                </a:r>
+                <a:r>
+                  <a:rPr lang="de-DE" dirty="0"/>
+                  <a:t> </a:t>
+                </a:r>
+                <a14:m>
+                  <m:oMath xmlns:m="http://schemas.openxmlformats.org/officeDocument/2006/math">
+                    <m:r>
+                      <a:rPr lang="de-DE" b="0" i="1" smtClean="0">
+                        <a:latin typeface="Cambria Math" panose="02040503050406030204" pitchFamily="18" charset="0"/>
+                        <a:ea typeface="Cambria Math" panose="02040503050406030204" pitchFamily="18" charset="0"/>
+                      </a:rPr>
+                      <m:t>𝐺</m:t>
+                    </m:r>
+                    <m:d>
+                      <m:dPr>
+                        <m:ctrlPr>
+                          <a:rPr lang="de-DE" i="1">
+                            <a:latin typeface="Cambria Math" panose="02040503050406030204" pitchFamily="18" charset="0"/>
+                            <a:ea typeface="Cambria Math" panose="02040503050406030204" pitchFamily="18" charset="0"/>
+                          </a:rPr>
+                        </m:ctrlPr>
+                      </m:dPr>
+                      <m:e>
+                        <m:r>
+                          <a:rPr lang="de-DE" i="1">
+                            <a:latin typeface="Cambria Math" panose="02040503050406030204" pitchFamily="18" charset="0"/>
+                            <a:ea typeface="Cambria Math" panose="02040503050406030204" pitchFamily="18" charset="0"/>
+                          </a:rPr>
+                          <m:t>𝑠</m:t>
+                        </m:r>
+                      </m:e>
+                    </m:d>
+                  </m:oMath>
+                </a14:m>
+                <a:r>
+                  <a:rPr lang="de-DE" dirty="0"/>
+                  <a:t>, </a:t>
+                </a:r>
+                <a:r>
+                  <a:rPr lang="de-DE" dirty="0" err="1"/>
+                  <a:t>the</a:t>
+                </a:r>
+                <a:r>
+                  <a:rPr lang="de-DE" dirty="0"/>
+                  <a:t> </a:t>
+                </a:r>
+                <a:r>
+                  <a:rPr lang="de-DE" dirty="0" err="1"/>
+                  <a:t>closed</a:t>
+                </a:r>
+                <a:r>
+                  <a:rPr lang="de-DE" dirty="0"/>
+                  <a:t>-loop </a:t>
+                </a:r>
+                <a:r>
+                  <a:rPr lang="de-DE" dirty="0" err="1"/>
+                  <a:t>transfer</a:t>
+                </a:r>
+                <a:r>
+                  <a:rPr lang="de-DE" dirty="0"/>
+                  <a:t> </a:t>
+                </a:r>
+                <a:r>
+                  <a:rPr lang="de-DE" dirty="0" err="1"/>
+                  <a:t>function</a:t>
+                </a:r>
+                <a:r>
+                  <a:rPr lang="de-DE" dirty="0"/>
+                  <a:t> </a:t>
+                </a:r>
+                <a:r>
+                  <a:rPr lang="de-DE" dirty="0" err="1"/>
+                  <a:t>for</a:t>
+                </a:r>
+                <a:r>
+                  <a:rPr lang="de-DE" dirty="0"/>
+                  <a:t> negative </a:t>
+                </a:r>
+                <a:r>
+                  <a:rPr lang="de-DE" dirty="0" err="1"/>
+                  <a:t>feedback</a:t>
+                </a:r>
+                <a:r>
+                  <a:rPr lang="de-DE" dirty="0"/>
+                  <a:t> </a:t>
+                </a:r>
+                <a:r>
+                  <a:rPr lang="de-DE" dirty="0" err="1"/>
+                  <a:t>with</a:t>
+                </a:r>
+                <a:r>
+                  <a:rPr lang="de-DE" dirty="0"/>
+                  <a:t> </a:t>
+                </a:r>
+                <a:r>
+                  <a:rPr lang="de-DE" dirty="0" err="1"/>
+                  <a:t>feedback</a:t>
+                </a:r>
+                <a:r>
+                  <a:rPr lang="de-DE" dirty="0"/>
+                  <a:t> </a:t>
+                </a:r>
+                <a:r>
+                  <a:rPr lang="de-DE" dirty="0" err="1"/>
+                  <a:t>path</a:t>
+                </a:r>
+                <a:r>
+                  <a:rPr lang="de-DE" dirty="0"/>
+                  <a:t> </a:t>
+                </a:r>
+                <a14:m>
+                  <m:oMath xmlns:m="http://schemas.openxmlformats.org/officeDocument/2006/math">
+                    <m:r>
+                      <a:rPr lang="de-DE" i="1">
+                        <a:latin typeface="Cambria Math" panose="02040503050406030204" pitchFamily="18" charset="0"/>
+                      </a:rPr>
+                      <m:t>𝐻</m:t>
+                    </m:r>
+                    <m:r>
+                      <a:rPr lang="de-DE" i="1">
+                        <a:latin typeface="Cambria Math" panose="02040503050406030204" pitchFamily="18" charset="0"/>
+                      </a:rPr>
+                      <m:t>(</m:t>
+                    </m:r>
+                    <m:r>
+                      <a:rPr lang="de-DE" i="1">
+                        <a:latin typeface="Cambria Math" panose="02040503050406030204" pitchFamily="18" charset="0"/>
+                      </a:rPr>
+                      <m:t>𝑠</m:t>
+                    </m:r>
+                    <m:r>
+                      <a:rPr lang="de-DE" b="0" i="1" smtClean="0">
+                        <a:latin typeface="Cambria Math" panose="02040503050406030204" pitchFamily="18" charset="0"/>
+                      </a:rPr>
+                      <m:t>)</m:t>
+                    </m:r>
+                  </m:oMath>
+                </a14:m>
+                <a:r>
+                  <a:rPr lang="de-DE" dirty="0"/>
+                  <a:t> </a:t>
+                </a:r>
+                <a:r>
+                  <a:rPr lang="de-DE" dirty="0" err="1"/>
+                  <a:t>reads</a:t>
+                </a:r>
+                <a:r>
+                  <a:rPr lang="de-DE" dirty="0"/>
+                  <a:t>:</a:t>
+                </a:r>
+              </a:p>
+              <a:p>
+                <a:pPr marL="0" indent="0">
+                  <a:buNone/>
+                </a:pPr>
+                <a:endParaRPr lang="de-DE" b="0" i="1" dirty="0">
+                  <a:latin typeface="Cambria Math" panose="02040503050406030204" pitchFamily="18" charset="0"/>
+                </a:endParaRPr>
+              </a:p>
+              <a:p>
+                <a:pPr marL="0" indent="0">
+                  <a:buNone/>
+                </a:pPr>
+                <a14:m>
+                  <m:oMathPara xmlns:m="http://schemas.openxmlformats.org/officeDocument/2006/math">
+                    <m:oMathParaPr>
+                      <m:jc m:val="center"/>
+                    </m:oMathParaPr>
+                    <m:oMath xmlns:m="http://schemas.openxmlformats.org/officeDocument/2006/math">
+                      <m:r>
+                        <a:rPr lang="de-DE" b="0" i="1" smtClean="0">
+                          <a:latin typeface="Cambria Math" panose="02040503050406030204" pitchFamily="18" charset="0"/>
+                        </a:rPr>
+                        <m:t>𝑇</m:t>
+                      </m:r>
+                      <m:d>
+                        <m:dPr>
+                          <m:ctrlPr>
+                            <a:rPr lang="de-DE" b="0" i="1" smtClean="0">
+                              <a:latin typeface="Cambria Math" panose="02040503050406030204" pitchFamily="18" charset="0"/>
+                            </a:rPr>
+                          </m:ctrlPr>
+                        </m:dPr>
+                        <m:e>
+                          <m:r>
+                            <a:rPr lang="de-DE" b="0" i="1" smtClean="0">
+                              <a:latin typeface="Cambria Math" panose="02040503050406030204" pitchFamily="18" charset="0"/>
+                            </a:rPr>
+                            <m:t>𝑠</m:t>
+                          </m:r>
+                        </m:e>
+                      </m:d>
+                      <m:r>
+                        <a:rPr lang="de-DE" b="0" i="1" smtClean="0">
+                          <a:latin typeface="Cambria Math" panose="02040503050406030204" pitchFamily="18" charset="0"/>
+                        </a:rPr>
+                        <m:t>=</m:t>
+                      </m:r>
+                      <m:f>
+                        <m:fPr>
+                          <m:ctrlPr>
+                            <a:rPr lang="de-DE" i="1" smtClean="0">
+                              <a:latin typeface="Cambria Math" panose="02040503050406030204" pitchFamily="18" charset="0"/>
+                            </a:rPr>
+                          </m:ctrlPr>
+                        </m:fPr>
+                        <m:num>
+                          <m:r>
+                            <a:rPr lang="de-DE" b="0" i="1" smtClean="0">
+                              <a:latin typeface="Cambria Math" panose="02040503050406030204" pitchFamily="18" charset="0"/>
+                            </a:rPr>
+                            <m:t>𝐺</m:t>
+                          </m:r>
+                          <m:r>
+                            <a:rPr lang="de-DE" b="0" i="1" smtClean="0">
+                              <a:latin typeface="Cambria Math" panose="02040503050406030204" pitchFamily="18" charset="0"/>
+                            </a:rPr>
+                            <m:t>(</m:t>
+                          </m:r>
+                          <m:r>
+                            <a:rPr lang="de-DE" b="0" i="1" smtClean="0">
+                              <a:latin typeface="Cambria Math" panose="02040503050406030204" pitchFamily="18" charset="0"/>
+                            </a:rPr>
+                            <m:t>𝑠</m:t>
+                          </m:r>
+                          <m:r>
+                            <a:rPr lang="de-DE" b="0" i="1" smtClean="0">
+                              <a:latin typeface="Cambria Math" panose="02040503050406030204" pitchFamily="18" charset="0"/>
+                            </a:rPr>
+                            <m:t>)</m:t>
+                          </m:r>
+                        </m:num>
+                        <m:den>
+                          <m:r>
+                            <a:rPr lang="de-DE" b="0" i="1" smtClean="0">
+                              <a:latin typeface="Cambria Math" panose="02040503050406030204" pitchFamily="18" charset="0"/>
+                            </a:rPr>
+                            <m:t>1+</m:t>
+                          </m:r>
+                          <m:r>
+                            <a:rPr lang="de-DE" b="0" i="1" smtClean="0">
+                              <a:latin typeface="Cambria Math" panose="02040503050406030204" pitchFamily="18" charset="0"/>
+                            </a:rPr>
+                            <m:t>𝐺</m:t>
+                          </m:r>
+                          <m:d>
+                            <m:dPr>
+                              <m:ctrlPr>
+                                <a:rPr lang="de-DE" b="0" i="1" smtClean="0">
+                                  <a:latin typeface="Cambria Math" panose="02040503050406030204" pitchFamily="18" charset="0"/>
+                                </a:rPr>
+                              </m:ctrlPr>
+                            </m:dPr>
+                            <m:e>
+                              <m:r>
+                                <a:rPr lang="de-DE" b="0" i="1" smtClean="0">
+                                  <a:latin typeface="Cambria Math" panose="02040503050406030204" pitchFamily="18" charset="0"/>
+                                </a:rPr>
+                                <m:t>𝑠</m:t>
+                              </m:r>
+                            </m:e>
+                          </m:d>
+                          <m:r>
+                            <a:rPr lang="de-DE" b="0" i="1" smtClean="0">
+                              <a:latin typeface="Cambria Math" panose="02040503050406030204" pitchFamily="18" charset="0"/>
+                            </a:rPr>
+                            <m:t>𝐻</m:t>
+                          </m:r>
+                          <m:r>
+                            <a:rPr lang="de-DE" b="0" i="1" smtClean="0">
+                              <a:latin typeface="Cambria Math" panose="02040503050406030204" pitchFamily="18" charset="0"/>
+                            </a:rPr>
+                            <m:t>(</m:t>
+                          </m:r>
+                          <m:r>
+                            <a:rPr lang="de-DE" b="0" i="1" smtClean="0">
+                              <a:latin typeface="Cambria Math" panose="02040503050406030204" pitchFamily="18" charset="0"/>
+                            </a:rPr>
+                            <m:t>𝑠</m:t>
+                          </m:r>
+                          <m:r>
+                            <a:rPr lang="de-DE" b="0" i="1" smtClean="0">
+                              <a:latin typeface="Cambria Math" panose="02040503050406030204" pitchFamily="18" charset="0"/>
+                            </a:rPr>
+                            <m:t>)</m:t>
+                          </m:r>
+                        </m:den>
+                      </m:f>
+                    </m:oMath>
+                  </m:oMathPara>
+                </a14:m>
+                <a:endParaRPr lang="de-DE" dirty="0"/>
+              </a:p>
+              <a:p>
+                <a:pPr marL="0" indent="0">
+                  <a:buNone/>
+                </a:pPr>
+                <a:endParaRPr lang="de-DE" dirty="0">
+                  <a:sym typeface="Wingdings" pitchFamily="2" charset="2"/>
+                </a:endParaRPr>
+              </a:p>
+              <a:p>
+                <a:pPr marL="0" indent="0">
+                  <a:buNone/>
+                </a:pPr>
+                <a:endParaRPr lang="de-DE" dirty="0">
+                  <a:sym typeface="Wingdings" pitchFamily="2" charset="2"/>
+                </a:endParaRPr>
+              </a:p>
+              <a:p>
+                <a:pPr marL="0" indent="0">
+                  <a:buNone/>
+                </a:pPr>
+                <a:r>
+                  <a:rPr lang="de-DE" dirty="0">
+                    <a:sym typeface="Wingdings" pitchFamily="2" charset="2"/>
+                  </a:rPr>
+                  <a:t> </a:t>
+                </a:r>
+                <a:r>
+                  <a:rPr lang="de-DE" dirty="0" err="1">
+                    <a:sym typeface="Wingdings" pitchFamily="2" charset="2"/>
+                  </a:rPr>
+                  <a:t>For</a:t>
+                </a:r>
+                <a:r>
+                  <a:rPr lang="de-DE" dirty="0">
+                    <a:sym typeface="Wingdings" pitchFamily="2" charset="2"/>
+                  </a:rPr>
+                  <a:t> </a:t>
+                </a:r>
+                <a:r>
+                  <a:rPr lang="de-DE" dirty="0" err="1">
+                    <a:sym typeface="Wingdings" pitchFamily="2" charset="2"/>
+                  </a:rPr>
+                  <a:t>closed</a:t>
+                </a:r>
+                <a:r>
+                  <a:rPr lang="de-DE" dirty="0">
+                    <a:sym typeface="Wingdings" pitchFamily="2" charset="2"/>
+                  </a:rPr>
+                  <a:t>-loop </a:t>
+                </a:r>
+                <a:r>
+                  <a:rPr lang="de-DE" dirty="0" err="1">
+                    <a:sym typeface="Wingdings" pitchFamily="2" charset="2"/>
+                  </a:rPr>
+                  <a:t>poles</a:t>
+                </a:r>
+                <a:r>
+                  <a:rPr lang="de-DE" dirty="0">
+                    <a:sym typeface="Wingdings" pitchFamily="2" charset="2"/>
+                  </a:rPr>
+                  <a:t>: </a:t>
+                </a:r>
+                <a14:m>
+                  <m:oMath xmlns:m="http://schemas.openxmlformats.org/officeDocument/2006/math">
+                    <m:r>
+                      <a:rPr lang="de-DE" b="0" i="1" smtClean="0">
+                        <a:latin typeface="Cambria Math" panose="02040503050406030204" pitchFamily="18" charset="0"/>
+                      </a:rPr>
+                      <m:t>𝐿</m:t>
+                    </m:r>
+                    <m:r>
+                      <a:rPr lang="de-DE" b="0" i="1" smtClean="0">
+                        <a:latin typeface="Cambria Math" panose="02040503050406030204" pitchFamily="18" charset="0"/>
+                      </a:rPr>
+                      <m:t>(</m:t>
+                    </m:r>
+                    <m:r>
+                      <a:rPr lang="de-DE" b="0" i="1" smtClean="0">
+                        <a:latin typeface="Cambria Math" panose="02040503050406030204" pitchFamily="18" charset="0"/>
+                      </a:rPr>
+                      <m:t>𝑠</m:t>
+                    </m:r>
+                    <m:r>
+                      <a:rPr lang="de-DE" b="0" i="1" smtClean="0">
+                        <a:latin typeface="Cambria Math" panose="02040503050406030204" pitchFamily="18" charset="0"/>
+                      </a:rPr>
+                      <m:t>)=−1</m:t>
+                    </m:r>
+                  </m:oMath>
+                </a14:m>
+                <a:endParaRPr lang="de-DE" dirty="0"/>
+              </a:p>
+              <a:p>
+                <a:pPr marL="0" indent="0">
+                  <a:buNone/>
+                </a:pPr>
+                <a:r>
+                  <a:rPr lang="de-DE" dirty="0" err="1"/>
+                  <a:t>Unstable</a:t>
+                </a:r>
+                <a:r>
+                  <a:rPr lang="de-DE" dirty="0"/>
+                  <a:t> </a:t>
+                </a:r>
+                <a:r>
+                  <a:rPr lang="de-DE" dirty="0" err="1"/>
+                  <a:t>if</a:t>
+                </a:r>
+                <a:r>
+                  <a:rPr lang="de-DE" dirty="0"/>
+                  <a:t> </a:t>
+                </a:r>
+                <a:r>
+                  <a:rPr lang="de-DE" dirty="0" err="1"/>
+                  <a:t>any</a:t>
+                </a:r>
+                <a:r>
+                  <a:rPr lang="de-DE" dirty="0"/>
+                  <a:t> </a:t>
+                </a:r>
+                <a:r>
+                  <a:rPr lang="de-DE" dirty="0" err="1"/>
+                  <a:t>solution</a:t>
+                </a:r>
+                <a:r>
+                  <a:rPr lang="de-DE" dirty="0"/>
+                  <a:t> </a:t>
+                </a:r>
+                <a:r>
+                  <a:rPr lang="de-DE" dirty="0" err="1"/>
+                  <a:t>for</a:t>
+                </a:r>
+                <a:r>
+                  <a:rPr lang="de-DE" dirty="0"/>
+                  <a:t> </a:t>
+                </a:r>
+                <a14:m>
+                  <m:oMath xmlns:m="http://schemas.openxmlformats.org/officeDocument/2006/math">
+                    <m:r>
+                      <a:rPr lang="de-DE" i="1">
+                        <a:latin typeface="Cambria Math" panose="02040503050406030204" pitchFamily="18" charset="0"/>
+                      </a:rPr>
+                      <m:t>𝑠</m:t>
+                    </m:r>
+                  </m:oMath>
+                </a14:m>
+                <a:r>
+                  <a:rPr lang="de-DE" dirty="0"/>
+                  <a:t> lies in RHP</a:t>
+                </a:r>
+              </a:p>
+            </p:txBody>
+          </p:sp>
+        </mc:Choice>
+        <mc:Fallback>
+          <p:sp>
+            <p:nvSpPr>
+              <p:cNvPr id="3" name="Inhaltsplatzhalter 2">
+                <a:extLst>
+                  <a:ext uri="{FF2B5EF4-FFF2-40B4-BE49-F238E27FC236}">
+                    <a16:creationId xmlns:a16="http://schemas.microsoft.com/office/drawing/2014/main" id="{35D72C74-EA2A-7E93-E737-35EBB0F1C4CD}"/>
+                  </a:ext>
+                </a:extLst>
+              </p:cNvPr>
+              <p:cNvSpPr>
+                <a:spLocks noGrp="1" noRot="1" noChangeAspect="1" noMove="1" noResize="1" noEditPoints="1" noAdjustHandles="1" noChangeArrowheads="1" noChangeShapeType="1" noTextEdit="1"/>
+              </p:cNvSpPr>
+              <p:nvPr>
+                <p:ph idx="1"/>
+              </p:nvPr>
+            </p:nvSpPr>
+            <p:spPr>
+              <a:blipFill>
+                <a:blip r:embed="rId2"/>
+                <a:stretch>
+                  <a:fillRect l="-1206" t="-2326" r="-241" b="-872"/>
+                </a:stretch>
+              </a:blipFill>
+            </p:spPr>
+            <p:txBody>
+              <a:bodyPr/>
+              <a:lstStyle/>
+              <a:p>
+                <a:r>
+                  <a:rPr lang="de-DE">
+                    <a:noFill/>
+                  </a:rPr>
+                  <a:t> </a:t>
+                </a:r>
+              </a:p>
+            </p:txBody>
+          </p:sp>
+        </mc:Fallback>
+      </mc:AlternateContent>
       <p:sp>
         <p:nvSpPr>
           <p:cNvPr id="4" name="Foliennummernplatzhalter 3">
             <a:extLst>
               <a:ext uri="{FF2B5EF4-FFF2-40B4-BE49-F238E27FC236}">
-                <a16:creationId xmlns:a16="http://schemas.microsoft.com/office/drawing/2014/main" id="{9695D79B-140F-ED0F-12F1-D63F0CD77AA1}"/>
+                <a16:creationId xmlns:a16="http://schemas.microsoft.com/office/drawing/2014/main" id="{049E60DA-4975-1021-EC76-A48FC45FE876}"/>
               </a:ext>
             </a:extLst>
           </p:cNvPr>
@@ -7138,10 +7624,257 @@
           </a:p>
         </p:txBody>
       </p:sp>
+      <mc:AlternateContent xmlns:mc="http://schemas.openxmlformats.org/markup-compatibility/2006">
+        <mc:Choice xmlns:a14="http://schemas.microsoft.com/office/drawing/2010/main" Requires="a14">
+          <p:sp>
+            <p:nvSpPr>
+              <p:cNvPr id="5" name="Textfeld 4">
+                <a:extLst>
+                  <a:ext uri="{FF2B5EF4-FFF2-40B4-BE49-F238E27FC236}">
+                    <a16:creationId xmlns:a16="http://schemas.microsoft.com/office/drawing/2014/main" id="{B9FBA90F-DB98-46B0-3BF8-07E81D37F651}"/>
+                  </a:ext>
+                </a:extLst>
+              </p:cNvPr>
+              <p:cNvSpPr txBox="1"/>
+              <p:nvPr/>
+            </p:nvSpPr>
+            <p:spPr>
+              <a:xfrm>
+                <a:off x="6281532" y="4253949"/>
+                <a:ext cx="2032031" cy="461665"/>
+              </a:xfrm>
+              <a:prstGeom prst="rect">
+                <a:avLst/>
+              </a:prstGeom>
+              <a:noFill/>
+            </p:spPr>
+            <p:txBody>
+              <a:bodyPr wrap="none" rtlCol="0">
+                <a:spAutoFit/>
+              </a:bodyPr>
+              <a:lstStyle/>
+              <a:p>
+                <a:r>
+                  <a:rPr lang="de-DE" sz="2400" dirty="0"/>
+                  <a:t>loop </a:t>
+                </a:r>
+                <a:r>
+                  <a:rPr lang="de-DE" sz="2400" dirty="0" err="1"/>
+                  <a:t>gain</a:t>
+                </a:r>
+                <a:r>
+                  <a:rPr lang="de-DE" sz="2400" dirty="0"/>
+                  <a:t> </a:t>
+                </a:r>
+                <a14:m>
+                  <m:oMath xmlns:m="http://schemas.openxmlformats.org/officeDocument/2006/math">
+                    <m:r>
+                      <a:rPr lang="de-DE" sz="2400" b="0" i="1" smtClean="0">
+                        <a:latin typeface="Cambria Math" panose="02040503050406030204" pitchFamily="18" charset="0"/>
+                      </a:rPr>
+                      <m:t>𝐿</m:t>
+                    </m:r>
+                    <m:r>
+                      <a:rPr lang="de-DE" sz="2400" i="1">
+                        <a:latin typeface="Cambria Math" panose="02040503050406030204" pitchFamily="18" charset="0"/>
+                      </a:rPr>
+                      <m:t>(</m:t>
+                    </m:r>
+                    <m:r>
+                      <a:rPr lang="de-DE" sz="2400" i="1">
+                        <a:latin typeface="Cambria Math" panose="02040503050406030204" pitchFamily="18" charset="0"/>
+                      </a:rPr>
+                      <m:t>𝑠</m:t>
+                    </m:r>
+                    <m:r>
+                      <a:rPr lang="de-DE" sz="2400" b="0" i="1" smtClean="0">
+                        <a:latin typeface="Cambria Math" panose="02040503050406030204" pitchFamily="18" charset="0"/>
+                      </a:rPr>
+                      <m:t>)</m:t>
+                    </m:r>
+                  </m:oMath>
+                </a14:m>
+                <a:endParaRPr lang="de-DE" sz="2400" dirty="0"/>
+              </a:p>
+            </p:txBody>
+          </p:sp>
+        </mc:Choice>
+        <mc:Fallback>
+          <p:sp>
+            <p:nvSpPr>
+              <p:cNvPr id="5" name="Textfeld 4">
+                <a:extLst>
+                  <a:ext uri="{FF2B5EF4-FFF2-40B4-BE49-F238E27FC236}">
+                    <a16:creationId xmlns:a16="http://schemas.microsoft.com/office/drawing/2014/main" id="{B9FBA90F-DB98-46B0-3BF8-07E81D37F651}"/>
+                  </a:ext>
+                </a:extLst>
+              </p:cNvPr>
+              <p:cNvSpPr txBox="1">
+                <a:spLocks noRot="1" noChangeAspect="1" noMove="1" noResize="1" noEditPoints="1" noAdjustHandles="1" noChangeArrowheads="1" noChangeShapeType="1" noTextEdit="1"/>
+              </p:cNvSpPr>
+              <p:nvPr/>
+            </p:nvSpPr>
+            <p:spPr>
+              <a:xfrm>
+                <a:off x="6281532" y="4253949"/>
+                <a:ext cx="2032031" cy="461665"/>
+              </a:xfrm>
+              <a:prstGeom prst="rect">
+                <a:avLst/>
+              </a:prstGeom>
+              <a:blipFill>
+                <a:blip r:embed="rId3"/>
+                <a:stretch>
+                  <a:fillRect l="-4348" t="-10811" r="-1863" b="-29730"/>
+                </a:stretch>
+              </a:blipFill>
+            </p:spPr>
+            <p:txBody>
+              <a:bodyPr/>
+              <a:lstStyle/>
+              <a:p>
+                <a:r>
+                  <a:rPr lang="de-DE">
+                    <a:noFill/>
+                  </a:rPr>
+                  <a:t> </a:t>
+                </a:r>
+              </a:p>
+            </p:txBody>
+          </p:sp>
+        </mc:Fallback>
+      </mc:AlternateContent>
+      <p:sp>
+        <p:nvSpPr>
+          <p:cNvPr id="6" name="Geschweifte Klammer links 5">
+            <a:extLst>
+              <a:ext uri="{FF2B5EF4-FFF2-40B4-BE49-F238E27FC236}">
+                <a16:creationId xmlns:a16="http://schemas.microsoft.com/office/drawing/2014/main" id="{04F4D8CD-9653-AD6A-8452-E42BCF2DAC17}"/>
+              </a:ext>
+            </a:extLst>
+          </p:cNvPr>
+          <p:cNvSpPr/>
+          <p:nvPr/>
+        </p:nvSpPr>
+        <p:spPr>
+          <a:xfrm rot="16200000">
+            <a:off x="6864378" y="3442503"/>
+            <a:ext cx="228600" cy="1394292"/>
+          </a:xfrm>
+          <a:prstGeom prst="leftBrace">
+            <a:avLst/>
+          </a:prstGeom>
+        </p:spPr>
+        <p:style>
+          <a:lnRef idx="2">
+            <a:schemeClr val="accent1"/>
+          </a:lnRef>
+          <a:fillRef idx="0">
+            <a:schemeClr val="accent1"/>
+          </a:fillRef>
+          <a:effectRef idx="1">
+            <a:schemeClr val="accent1"/>
+          </a:effectRef>
+          <a:fontRef idx="minor">
+            <a:schemeClr val="tx1"/>
+          </a:fontRef>
+        </p:style>
+        <p:txBody>
+          <a:bodyPr rtlCol="0" anchor="ctr"/>
+          <a:lstStyle/>
+          <a:p>
+            <a:pPr algn="ctr"/>
+            <a:endParaRPr lang="de-DE"/>
+          </a:p>
+        </p:txBody>
+      </p:sp>
+      <p:sp>
+        <p:nvSpPr>
+          <p:cNvPr id="7" name="Textfeld 6">
+            <a:extLst>
+              <a:ext uri="{FF2B5EF4-FFF2-40B4-BE49-F238E27FC236}">
+                <a16:creationId xmlns:a16="http://schemas.microsoft.com/office/drawing/2014/main" id="{CBD6FFE9-3BFD-8E37-B50F-B0B119EED47E}"/>
+              </a:ext>
+            </a:extLst>
+          </p:cNvPr>
+          <p:cNvSpPr txBox="1"/>
+          <p:nvPr/>
+        </p:nvSpPr>
+        <p:spPr>
+          <a:xfrm>
+            <a:off x="8292548" y="2782956"/>
+            <a:ext cx="1871859" cy="461665"/>
+          </a:xfrm>
+          <a:prstGeom prst="rect">
+            <a:avLst/>
+          </a:prstGeom>
+          <a:noFill/>
+        </p:spPr>
+        <p:txBody>
+          <a:bodyPr wrap="none" rtlCol="0">
+            <a:spAutoFit/>
+          </a:bodyPr>
+          <a:lstStyle/>
+          <a:p>
+            <a:r>
+              <a:rPr lang="de-DE" sz="2400" dirty="0" err="1"/>
+              <a:t>forward</a:t>
+            </a:r>
+            <a:r>
+              <a:rPr lang="de-DE" sz="2400" dirty="0"/>
+              <a:t> </a:t>
+            </a:r>
+            <a:r>
+              <a:rPr lang="de-DE" sz="2400" dirty="0" err="1"/>
+              <a:t>path</a:t>
+            </a:r>
+            <a:endParaRPr lang="de-DE" sz="2400" dirty="0"/>
+          </a:p>
+        </p:txBody>
+      </p:sp>
+      <p:cxnSp>
+        <p:nvCxnSpPr>
+          <p:cNvPr id="9" name="Gerade Verbindung mit Pfeil 8">
+            <a:extLst>
+              <a:ext uri="{FF2B5EF4-FFF2-40B4-BE49-F238E27FC236}">
+                <a16:creationId xmlns:a16="http://schemas.microsoft.com/office/drawing/2014/main" id="{0DC74A13-5E56-7588-1E09-FFDD12F1E938}"/>
+              </a:ext>
+            </a:extLst>
+          </p:cNvPr>
+          <p:cNvCxnSpPr/>
+          <p:nvPr/>
+        </p:nvCxnSpPr>
+        <p:spPr>
+          <a:xfrm flipH="1">
+            <a:off x="7056783" y="3001617"/>
+            <a:ext cx="1202634" cy="228600"/>
+          </a:xfrm>
+          <a:prstGeom prst="straightConnector1">
+            <a:avLst/>
+          </a:prstGeom>
+          <a:ln>
+            <a:tailEnd type="triangle"/>
+          </a:ln>
+        </p:spPr>
+        <p:style>
+          <a:lnRef idx="2">
+            <a:schemeClr val="accent1"/>
+          </a:lnRef>
+          <a:fillRef idx="0">
+            <a:schemeClr val="accent1"/>
+          </a:fillRef>
+          <a:effectRef idx="1">
+            <a:schemeClr val="accent1"/>
+          </a:effectRef>
+          <a:fontRef idx="minor">
+            <a:schemeClr val="tx1"/>
+          </a:fontRef>
+        </p:style>
+      </p:cxnSp>
     </p:spTree>
     <p:extLst>
       <p:ext uri="{BB962C8B-B14F-4D97-AF65-F5344CB8AC3E}">
-        <p14:creationId xmlns:p14="http://schemas.microsoft.com/office/powerpoint/2010/main" val="1043321803"/>
+        <p14:creationId xmlns:p14="http://schemas.microsoft.com/office/powerpoint/2010/main" val="4228420220"/>
       </p:ext>
     </p:extLst>
   </p:cSld>
@@ -7173,7 +7906,7 @@
           <p:cNvPr id="2" name="Titel 1">
             <a:extLst>
               <a:ext uri="{FF2B5EF4-FFF2-40B4-BE49-F238E27FC236}">
-                <a16:creationId xmlns:a16="http://schemas.microsoft.com/office/drawing/2014/main" id="{E3D76B9D-A952-FA61-3FEA-B2C35BC9EBA5}"/>
+                <a16:creationId xmlns:a16="http://schemas.microsoft.com/office/drawing/2014/main" id="{2A122470-E3B4-6307-0EA5-F1B7F554835F}"/>
               </a:ext>
             </a:extLst>
           </p:cNvPr>
@@ -7191,129 +7924,586 @@
           <a:p>
             <a:r>
               <a:rPr lang="de-DE" dirty="0" err="1"/>
-              <a:t>Gain</a:t>
+              <a:t>Nyquist</a:t>
             </a:r>
             <a:r>
               <a:rPr lang="de-DE" dirty="0"/>
-              <a:t> and Phase </a:t>
+              <a:t> </a:t>
             </a:r>
             <a:r>
               <a:rPr lang="de-DE" dirty="0" err="1"/>
-              <a:t>Margins</a:t>
+              <a:t>Stability</a:t>
+            </a:r>
+            <a:r>
+              <a:rPr lang="de-DE" dirty="0"/>
+              <a:t> </a:t>
+            </a:r>
+            <a:r>
+              <a:rPr lang="de-DE" dirty="0" err="1"/>
+              <a:t>Criterion</a:t>
             </a:r>
             <a:endParaRPr lang="de-DE" dirty="0"/>
           </a:p>
         </p:txBody>
       </p:sp>
-      <p:sp>
-        <p:nvSpPr>
-          <p:cNvPr id="3" name="Inhaltsplatzhalter 2">
-            <a:extLst>
-              <a:ext uri="{FF2B5EF4-FFF2-40B4-BE49-F238E27FC236}">
-                <a16:creationId xmlns:a16="http://schemas.microsoft.com/office/drawing/2014/main" id="{841DCEC5-E062-73EC-599B-965A44B5F682}"/>
-              </a:ext>
-            </a:extLst>
-          </p:cNvPr>
-          <p:cNvSpPr>
-            <a:spLocks noGrp="1"/>
-          </p:cNvSpPr>
-          <p:nvPr>
-            <p:ph idx="1"/>
-          </p:nvPr>
-        </p:nvSpPr>
-        <p:spPr/>
-        <p:txBody>
-          <a:bodyPr/>
-          <a:lstStyle/>
-          <a:p>
-            <a:r>
-              <a:rPr lang="de-DE" dirty="0" err="1"/>
-              <a:t>Measure</a:t>
-            </a:r>
-            <a:r>
-              <a:rPr lang="de-DE" dirty="0"/>
-              <a:t> </a:t>
-            </a:r>
-            <a:r>
-              <a:rPr lang="de-DE" dirty="0" err="1"/>
-              <a:t>distance</a:t>
-            </a:r>
-            <a:r>
-              <a:rPr lang="de-DE" dirty="0"/>
-              <a:t> </a:t>
-            </a:r>
-            <a:r>
-              <a:rPr lang="de-DE" dirty="0" err="1"/>
-              <a:t>to</a:t>
-            </a:r>
-            <a:r>
-              <a:rPr lang="de-DE" dirty="0"/>
-              <a:t> </a:t>
-            </a:r>
-            <a:r>
-              <a:rPr lang="de-DE" dirty="0" err="1"/>
-              <a:t>instability</a:t>
-            </a:r>
-            <a:endParaRPr lang="de-DE" dirty="0"/>
-          </a:p>
-          <a:p>
-            <a:r>
-              <a:rPr lang="de-DE" dirty="0" err="1"/>
-              <a:t>Practical</a:t>
-            </a:r>
-            <a:r>
-              <a:rPr lang="de-DE" dirty="0"/>
-              <a:t> </a:t>
-            </a:r>
-            <a:r>
-              <a:rPr lang="de-DE" dirty="0" err="1"/>
-              <a:t>robustness</a:t>
-            </a:r>
-            <a:r>
-              <a:rPr lang="de-DE" dirty="0"/>
-              <a:t> </a:t>
-            </a:r>
-            <a:r>
-              <a:rPr lang="de-DE" dirty="0" err="1"/>
-              <a:t>indicators</a:t>
-            </a:r>
-            <a:endParaRPr lang="de-DE" dirty="0"/>
-          </a:p>
-          <a:p>
-            <a:r>
-              <a:rPr lang="de-DE" dirty="0"/>
-              <a:t>Read </a:t>
-            </a:r>
-            <a:r>
-              <a:rPr lang="de-DE" dirty="0" err="1"/>
-              <a:t>directly</a:t>
-            </a:r>
-            <a:r>
-              <a:rPr lang="de-DE" dirty="0"/>
-              <a:t> </a:t>
-            </a:r>
-            <a:r>
-              <a:rPr lang="de-DE" dirty="0" err="1"/>
-              <a:t>from</a:t>
-            </a:r>
-            <a:r>
-              <a:rPr lang="de-DE" dirty="0"/>
-              <a:t> Bode </a:t>
-            </a:r>
-            <a:r>
-              <a:rPr lang="de-DE" dirty="0" err="1"/>
-              <a:t>plots</a:t>
-            </a:r>
-            <a:endParaRPr lang="de-DE" dirty="0"/>
-          </a:p>
-        </p:txBody>
-      </p:sp>
+      <mc:AlternateContent xmlns:mc="http://schemas.openxmlformats.org/markup-compatibility/2006">
+        <mc:Choice xmlns:a14="http://schemas.microsoft.com/office/drawing/2010/main" Requires="a14">
+          <p:sp>
+            <p:nvSpPr>
+              <p:cNvPr id="3" name="Inhaltsplatzhalter 2">
+                <a:extLst>
+                  <a:ext uri="{FF2B5EF4-FFF2-40B4-BE49-F238E27FC236}">
+                    <a16:creationId xmlns:a16="http://schemas.microsoft.com/office/drawing/2014/main" id="{C52AFC97-0C0F-D7E6-966D-ED72FE114700}"/>
+                  </a:ext>
+                </a:extLst>
+              </p:cNvPr>
+              <p:cNvSpPr>
+                <a:spLocks noGrp="1"/>
+              </p:cNvSpPr>
+              <p:nvPr>
+                <p:ph idx="1"/>
+              </p:nvPr>
+            </p:nvSpPr>
+            <p:spPr>
+              <a:xfrm>
+                <a:off x="838200" y="1825625"/>
+                <a:ext cx="6691124" cy="4667250"/>
+              </a:xfrm>
+            </p:spPr>
+            <p:txBody>
+              <a:bodyPr>
+                <a:normAutofit/>
+              </a:bodyPr>
+              <a:lstStyle/>
+              <a:p>
+                <a:pPr marL="0" indent="0">
+                  <a:buNone/>
+                </a:pPr>
+                <a:r>
+                  <a:rPr lang="de-DE" sz="2400" dirty="0"/>
+                  <a:t>Consider </a:t>
+                </a:r>
+                <a:r>
+                  <a:rPr lang="de-DE" sz="2400" dirty="0" err="1"/>
+                  <a:t>Nyquist</a:t>
+                </a:r>
+                <a:r>
+                  <a:rPr lang="de-DE" sz="2400" dirty="0"/>
+                  <a:t> </a:t>
+                </a:r>
+                <a:r>
+                  <a:rPr lang="de-DE" sz="2400" dirty="0" err="1"/>
+                  <a:t>curve</a:t>
+                </a:r>
+                <a:r>
+                  <a:rPr lang="de-DE" sz="2400" dirty="0"/>
+                  <a:t> </a:t>
+                </a:r>
+                <a:r>
+                  <a:rPr lang="de-DE" sz="2400" dirty="0" err="1"/>
+                  <a:t>for</a:t>
+                </a:r>
+                <a:r>
+                  <a:rPr lang="de-DE" sz="2400" dirty="0"/>
+                  <a:t> </a:t>
+                </a:r>
+                <a14:m>
+                  <m:oMath xmlns:m="http://schemas.openxmlformats.org/officeDocument/2006/math">
+                    <m:r>
+                      <a:rPr lang="de-DE" sz="2400" b="0" i="1" smtClean="0">
+                        <a:latin typeface="Cambria Math" panose="02040503050406030204" pitchFamily="18" charset="0"/>
+                        <a:ea typeface="Cambria Math" panose="02040503050406030204" pitchFamily="18" charset="0"/>
+                      </a:rPr>
+                      <m:t>𝐿</m:t>
+                    </m:r>
+                    <m:d>
+                      <m:dPr>
+                        <m:ctrlPr>
+                          <a:rPr lang="de-DE" sz="2400" i="1">
+                            <a:latin typeface="Cambria Math" panose="02040503050406030204" pitchFamily="18" charset="0"/>
+                          </a:rPr>
+                        </m:ctrlPr>
+                      </m:dPr>
+                      <m:e>
+                        <m:r>
+                          <a:rPr lang="de-DE" sz="2400" i="1">
+                            <a:latin typeface="Cambria Math" panose="02040503050406030204" pitchFamily="18" charset="0"/>
+                          </a:rPr>
+                          <m:t>𝑗</m:t>
+                        </m:r>
+                        <m:r>
+                          <a:rPr lang="de-DE" sz="2400" i="1">
+                            <a:latin typeface="Cambria Math" panose="02040503050406030204" pitchFamily="18" charset="0"/>
+                            <a:ea typeface="Cambria Math" panose="02040503050406030204" pitchFamily="18" charset="0"/>
+                          </a:rPr>
+                          <m:t>𝜔</m:t>
+                        </m:r>
+                      </m:e>
+                    </m:d>
+                  </m:oMath>
+                </a14:m>
+                <a:endParaRPr lang="de-DE" sz="2400" dirty="0"/>
+              </a:p>
+              <a:p>
+                <a:pPr marL="0" indent="0">
+                  <a:buNone/>
+                </a:pPr>
+                <a:r>
+                  <a:rPr lang="de-DE" sz="2400" dirty="0">
+                    <a:sym typeface="Wingdings" pitchFamily="2" charset="2"/>
+                  </a:rPr>
+                  <a:t> </a:t>
+                </a:r>
+                <a:r>
+                  <a:rPr lang="de-DE" sz="2400" dirty="0" err="1">
+                    <a:sym typeface="Wingdings" pitchFamily="2" charset="2"/>
+                  </a:rPr>
+                  <a:t>e</a:t>
+                </a:r>
+                <a:r>
+                  <a:rPr lang="de-DE" sz="2400" dirty="0" err="1"/>
+                  <a:t>valuation</a:t>
+                </a:r>
+                <a:r>
+                  <a:rPr lang="de-DE" sz="2400" dirty="0"/>
+                  <a:t> </a:t>
+                </a:r>
+                <a:r>
+                  <a:rPr lang="de-DE" sz="2400" dirty="0" err="1"/>
+                  <a:t>along</a:t>
+                </a:r>
+                <a:r>
+                  <a:rPr lang="de-DE" sz="2400" dirty="0"/>
+                  <a:t> </a:t>
+                </a:r>
+                <a:r>
+                  <a:rPr lang="de-DE" sz="2400" dirty="0" err="1"/>
+                  <a:t>the</a:t>
+                </a:r>
+                <a:r>
+                  <a:rPr lang="de-DE" sz="2400" dirty="0"/>
+                  <a:t> </a:t>
+                </a:r>
+                <a:r>
+                  <a:rPr lang="de-DE" sz="2400" dirty="0" err="1"/>
+                  <a:t>imaginary</a:t>
+                </a:r>
+                <a:r>
+                  <a:rPr lang="de-DE" sz="2400" dirty="0"/>
+                  <a:t> </a:t>
+                </a:r>
+                <a:r>
+                  <a:rPr lang="de-DE" sz="2400" dirty="0" err="1"/>
+                  <a:t>axis</a:t>
+                </a:r>
+                <a:r>
+                  <a:rPr lang="de-DE" sz="2400" dirty="0"/>
+                  <a:t> </a:t>
+                </a:r>
+                <a:r>
+                  <a:rPr lang="de-DE" sz="2400" dirty="0" err="1"/>
+                  <a:t>of</a:t>
+                </a:r>
+                <a:r>
+                  <a:rPr lang="de-DE" sz="2400" dirty="0"/>
+                  <a:t> </a:t>
+                </a:r>
+                <a14:m>
+                  <m:oMath xmlns:m="http://schemas.openxmlformats.org/officeDocument/2006/math">
+                    <m:r>
+                      <a:rPr lang="de-DE" sz="2400" i="1">
+                        <a:latin typeface="Cambria Math" panose="02040503050406030204" pitchFamily="18" charset="0"/>
+                      </a:rPr>
+                      <m:t>𝑠</m:t>
+                    </m:r>
+                  </m:oMath>
+                </a14:m>
+                <a:r>
+                  <a:rPr lang="de-DE" sz="2400" dirty="0"/>
+                  <a:t> (</a:t>
+                </a:r>
+                <a:r>
+                  <a:rPr lang="de-DE" sz="2400" dirty="0" err="1"/>
+                  <a:t>boundary</a:t>
+                </a:r>
+                <a:r>
+                  <a:rPr lang="de-DE" sz="2400" dirty="0"/>
+                  <a:t> </a:t>
+                </a:r>
+                <a:r>
+                  <a:rPr lang="de-DE" sz="2400" dirty="0" err="1"/>
+                  <a:t>of</a:t>
+                </a:r>
+                <a:r>
+                  <a:rPr lang="de-DE" sz="2400" dirty="0"/>
+                  <a:t> RHP)</a:t>
+                </a:r>
+              </a:p>
+              <a:p>
+                <a:pPr marL="0" indent="0">
+                  <a:buNone/>
+                </a:pPr>
+                <a:endParaRPr lang="de-DE" sz="2400" dirty="0"/>
+              </a:p>
+              <a:p>
+                <a:pPr marL="0" indent="0">
+                  <a:buNone/>
+                </a:pPr>
+                <a:r>
+                  <a:rPr lang="de-DE" sz="2400" dirty="0"/>
+                  <a:t>Critical </a:t>
+                </a:r>
+                <a:r>
+                  <a:rPr lang="de-DE" sz="2400" dirty="0" err="1"/>
+                  <a:t>point</a:t>
+                </a:r>
+                <a:r>
+                  <a:rPr lang="de-DE" sz="2400" dirty="0"/>
+                  <a:t> </a:t>
+                </a:r>
+                <a14:m>
+                  <m:oMath xmlns:m="http://schemas.openxmlformats.org/officeDocument/2006/math">
+                    <m:r>
+                      <a:rPr lang="de-DE" sz="2400" b="0" i="1" smtClean="0">
+                        <a:latin typeface="Cambria Math" panose="02040503050406030204" pitchFamily="18" charset="0"/>
+                      </a:rPr>
+                      <m:t>−1+</m:t>
+                    </m:r>
+                    <m:r>
+                      <a:rPr lang="de-DE" sz="2400" b="0" i="1" smtClean="0">
+                        <a:latin typeface="Cambria Math" panose="02040503050406030204" pitchFamily="18" charset="0"/>
+                      </a:rPr>
+                      <m:t>𝑗</m:t>
+                    </m:r>
+                    <m:r>
+                      <a:rPr lang="de-DE" sz="2400" b="0" i="1" smtClean="0">
+                        <a:latin typeface="Cambria Math" panose="02040503050406030204" pitchFamily="18" charset="0"/>
+                      </a:rPr>
+                      <m:t>0</m:t>
+                    </m:r>
+                  </m:oMath>
+                </a14:m>
+                <a:r>
+                  <a:rPr lang="de-DE" sz="2400" dirty="0">
+                    <a:sym typeface="Wingdings" pitchFamily="2" charset="2"/>
+                  </a:rPr>
+                  <a:t>: </a:t>
+                </a:r>
+                <a:r>
+                  <a:rPr lang="de-DE" sz="2400" dirty="0" err="1">
+                    <a:sym typeface="Wingdings" pitchFamily="2" charset="2"/>
+                  </a:rPr>
+                  <a:t>closed</a:t>
+                </a:r>
+                <a:r>
+                  <a:rPr lang="de-DE" sz="2400" dirty="0">
+                    <a:sym typeface="Wingdings" pitchFamily="2" charset="2"/>
+                  </a:rPr>
+                  <a:t>-loop pole</a:t>
+                </a:r>
+              </a:p>
+              <a:p>
+                <a:pPr marL="0" indent="0">
+                  <a:buNone/>
+                </a:pPr>
+                <a:endParaRPr lang="de-DE" sz="2400" dirty="0"/>
+              </a:p>
+              <a:p>
+                <a:pPr marL="0" indent="0">
+                  <a:buNone/>
+                </a:pPr>
+                <a:r>
+                  <a:rPr lang="de-DE" sz="2400" dirty="0" err="1"/>
+                  <a:t>If</a:t>
+                </a:r>
+                <a:r>
+                  <a:rPr lang="de-DE" sz="2400" dirty="0"/>
+                  <a:t> </a:t>
+                </a:r>
+                <a:r>
+                  <a:rPr lang="de-DE" sz="2400" dirty="0" err="1"/>
+                  <a:t>curve</a:t>
+                </a:r>
+                <a:r>
+                  <a:rPr lang="de-DE" sz="2400" dirty="0"/>
+                  <a:t> </a:t>
+                </a:r>
+                <a:r>
+                  <a:rPr lang="de-DE" sz="2400" dirty="0" err="1"/>
+                  <a:t>encircles</a:t>
+                </a:r>
+                <a:r>
+                  <a:rPr lang="de-DE" sz="2400" dirty="0"/>
+                  <a:t> </a:t>
+                </a:r>
+                <a:r>
+                  <a:rPr lang="de-DE" sz="2400" dirty="0" err="1"/>
+                  <a:t>critical</a:t>
+                </a:r>
+                <a:r>
+                  <a:rPr lang="de-DE" sz="2400" dirty="0"/>
+                  <a:t> </a:t>
+                </a:r>
+                <a:r>
+                  <a:rPr lang="de-DE" sz="2400" dirty="0" err="1"/>
+                  <a:t>point</a:t>
+                </a:r>
+                <a:r>
+                  <a:rPr lang="de-DE" sz="2400" dirty="0"/>
+                  <a:t>,</a:t>
+                </a:r>
+                <a:r>
+                  <a:rPr lang="de-DE" sz="2400" dirty="0">
+                    <a:sym typeface="Wingdings" pitchFamily="2" charset="2"/>
+                  </a:rPr>
+                  <a:t> </a:t>
+                </a:r>
+                <a14:m>
+                  <m:oMath xmlns:m="http://schemas.openxmlformats.org/officeDocument/2006/math">
+                    <m:r>
+                      <a:rPr lang="de-DE" sz="2400" b="0" i="1" smtClean="0">
+                        <a:latin typeface="Cambria Math" panose="02040503050406030204" pitchFamily="18" charset="0"/>
+                      </a:rPr>
+                      <m:t>𝐿</m:t>
+                    </m:r>
+                    <m:r>
+                      <a:rPr lang="de-DE" sz="2400" i="1">
+                        <a:latin typeface="Cambria Math" panose="02040503050406030204" pitchFamily="18" charset="0"/>
+                      </a:rPr>
+                      <m:t>(</m:t>
+                    </m:r>
+                    <m:r>
+                      <a:rPr lang="de-DE" sz="2400" i="1">
+                        <a:latin typeface="Cambria Math" panose="02040503050406030204" pitchFamily="18" charset="0"/>
+                      </a:rPr>
+                      <m:t>𝑠</m:t>
+                    </m:r>
+                    <m:r>
+                      <a:rPr lang="de-DE" sz="2400" i="1">
+                        <a:latin typeface="Cambria Math" panose="02040503050406030204" pitchFamily="18" charset="0"/>
+                      </a:rPr>
+                      <m:t>)=−1</m:t>
+                    </m:r>
+                  </m:oMath>
+                </a14:m>
+                <a:r>
+                  <a:rPr lang="de-DE" sz="2400" dirty="0"/>
+                  <a:t> has </a:t>
+                </a:r>
+                <a:r>
+                  <a:rPr lang="de-DE" sz="2400" dirty="0" err="1"/>
+                  <a:t>solutions</a:t>
+                </a:r>
+                <a:r>
+                  <a:rPr lang="de-DE" sz="2400" dirty="0"/>
+                  <a:t> in RHP </a:t>
+                </a:r>
+                <a:r>
+                  <a:rPr lang="de-DE" sz="2400" dirty="0">
+                    <a:sym typeface="Wingdings" pitchFamily="2" charset="2"/>
+                  </a:rPr>
+                  <a:t> </a:t>
+                </a:r>
+                <a:r>
+                  <a:rPr lang="de-DE" sz="2400" dirty="0" err="1">
+                    <a:sym typeface="Wingdings" pitchFamily="2" charset="2"/>
+                  </a:rPr>
+                  <a:t>closed</a:t>
+                </a:r>
+                <a:r>
+                  <a:rPr lang="de-DE" sz="2400" dirty="0">
+                    <a:sym typeface="Wingdings" pitchFamily="2" charset="2"/>
+                  </a:rPr>
+                  <a:t> loop </a:t>
+                </a:r>
+                <a:r>
+                  <a:rPr lang="de-DE" sz="2400" dirty="0" err="1">
+                    <a:sym typeface="Wingdings" pitchFamily="2" charset="2"/>
+                  </a:rPr>
+                  <a:t>unstable</a:t>
+                </a:r>
+                <a:endParaRPr lang="de-DE" sz="2400" dirty="0"/>
+              </a:p>
+              <a:p>
+                <a:pPr marL="0" indent="0">
+                  <a:buNone/>
+                </a:pPr>
+                <a:r>
+                  <a:rPr lang="de-DE" sz="2400" dirty="0"/>
+                  <a:t>(</a:t>
+                </a:r>
+                <a:r>
+                  <a:rPr lang="de-DE" sz="2400" dirty="0" err="1"/>
+                  <a:t>Encirclement</a:t>
+                </a:r>
+                <a:r>
+                  <a:rPr lang="de-DE" sz="2400" dirty="0"/>
+                  <a:t> </a:t>
+                </a:r>
+                <a:r>
+                  <a:rPr lang="de-DE" sz="2400" dirty="0" err="1"/>
+                  <a:t>is</a:t>
+                </a:r>
+                <a:r>
+                  <a:rPr lang="de-DE" sz="2400" dirty="0"/>
+                  <a:t> a </a:t>
+                </a:r>
+                <a:r>
+                  <a:rPr lang="de-DE" sz="2400" dirty="0" err="1"/>
+                  <a:t>topological</a:t>
+                </a:r>
+                <a:r>
+                  <a:rPr lang="de-DE" sz="2400" dirty="0"/>
+                  <a:t> </a:t>
+                </a:r>
+                <a:r>
+                  <a:rPr lang="de-DE" sz="2400" dirty="0" err="1"/>
+                  <a:t>signature</a:t>
+                </a:r>
+                <a:r>
+                  <a:rPr lang="de-DE" sz="2400" dirty="0"/>
+                  <a:t> </a:t>
+                </a:r>
+                <a:r>
+                  <a:rPr lang="de-DE" sz="2400" dirty="0" err="1"/>
+                  <a:t>of</a:t>
+                </a:r>
+                <a:r>
+                  <a:rPr lang="de-DE" sz="2400" dirty="0"/>
+                  <a:t> a root </a:t>
+                </a:r>
+                <a:r>
+                  <a:rPr lang="de-DE" sz="2400" dirty="0" err="1"/>
+                  <a:t>inside</a:t>
+                </a:r>
+                <a:r>
+                  <a:rPr lang="de-DE" sz="2400" dirty="0"/>
+                  <a:t>. </a:t>
+                </a:r>
+                <a:r>
+                  <a:rPr lang="de-DE" sz="2400" dirty="0" err="1"/>
+                  <a:t>It</a:t>
+                </a:r>
+                <a:r>
+                  <a:rPr lang="de-DE" sz="2400" dirty="0"/>
+                  <a:t> </a:t>
+                </a:r>
+                <a:r>
+                  <a:rPr lang="de-DE" sz="2400" dirty="0" err="1"/>
+                  <a:t>considers</a:t>
+                </a:r>
+                <a:r>
+                  <a:rPr lang="de-DE" sz="2400" dirty="0"/>
+                  <a:t> </a:t>
+                </a:r>
+                <a:r>
+                  <a:rPr lang="de-DE" sz="2400" dirty="0" err="1"/>
+                  <a:t>both</a:t>
+                </a:r>
+                <a:r>
+                  <a:rPr lang="de-DE" sz="2400" dirty="0"/>
+                  <a:t> positive-</a:t>
+                </a:r>
+                <a:r>
+                  <a:rPr lang="de-DE" sz="2400" dirty="0" err="1"/>
+                  <a:t>frequency</a:t>
+                </a:r>
+                <a:r>
+                  <a:rPr lang="de-DE" sz="2400" dirty="0"/>
+                  <a:t> and negative-</a:t>
+                </a:r>
+                <a:r>
+                  <a:rPr lang="de-DE" sz="2400" dirty="0" err="1"/>
+                  <a:t>frequency</a:t>
+                </a:r>
+                <a:r>
+                  <a:rPr lang="de-DE" sz="2400" dirty="0"/>
+                  <a:t> </a:t>
+                </a:r>
+                <a:r>
+                  <a:rPr lang="de-DE" sz="2400" dirty="0" err="1"/>
+                  <a:t>branches</a:t>
+                </a:r>
+                <a:r>
+                  <a:rPr lang="de-DE" sz="2400" dirty="0"/>
+                  <a:t>: </a:t>
+                </a:r>
+                <a14:m>
+                  <m:oMath xmlns:m="http://schemas.openxmlformats.org/officeDocument/2006/math">
+                    <m:r>
+                      <a:rPr lang="de-DE" sz="2400" i="1" smtClean="0">
+                        <a:latin typeface="Cambria Math" panose="02040503050406030204" pitchFamily="18" charset="0"/>
+                        <a:ea typeface="Cambria Math" panose="02040503050406030204" pitchFamily="18" charset="0"/>
+                      </a:rPr>
+                      <m:t>𝜔</m:t>
+                    </m:r>
+                    <m:r>
+                      <a:rPr lang="de-DE" sz="2400" b="0" i="1" smtClean="0">
+                        <a:latin typeface="Cambria Math" panose="02040503050406030204" pitchFamily="18" charset="0"/>
+                        <a:ea typeface="Cambria Math" panose="02040503050406030204" pitchFamily="18" charset="0"/>
+                      </a:rPr>
+                      <m:t>:−∞→+∞</m:t>
+                    </m:r>
+                  </m:oMath>
+                </a14:m>
+                <a:r>
+                  <a:rPr lang="de-DE" sz="2400" dirty="0"/>
+                  <a:t>)</a:t>
+                </a:r>
+              </a:p>
+            </p:txBody>
+          </p:sp>
+        </mc:Choice>
+        <mc:Fallback>
+          <p:sp>
+            <p:nvSpPr>
+              <p:cNvPr id="3" name="Inhaltsplatzhalter 2">
+                <a:extLst>
+                  <a:ext uri="{FF2B5EF4-FFF2-40B4-BE49-F238E27FC236}">
+                    <a16:creationId xmlns:a16="http://schemas.microsoft.com/office/drawing/2014/main" id="{C52AFC97-0C0F-D7E6-966D-ED72FE114700}"/>
+                  </a:ext>
+                </a:extLst>
+              </p:cNvPr>
+              <p:cNvSpPr>
+                <a:spLocks noGrp="1" noRot="1" noChangeAspect="1" noMove="1" noResize="1" noEditPoints="1" noAdjustHandles="1" noChangeArrowheads="1" noChangeShapeType="1" noTextEdit="1"/>
+              </p:cNvSpPr>
+              <p:nvPr>
+                <p:ph idx="1"/>
+              </p:nvPr>
+            </p:nvSpPr>
+            <p:spPr>
+              <a:xfrm>
+                <a:off x="838200" y="1825625"/>
+                <a:ext cx="6691124" cy="4667250"/>
+              </a:xfrm>
+              <a:blipFill>
+                <a:blip r:embed="rId2"/>
+                <a:stretch>
+                  <a:fillRect l="-1518" t="-1897"/>
+                </a:stretch>
+              </a:blipFill>
+            </p:spPr>
+            <p:txBody>
+              <a:bodyPr/>
+              <a:lstStyle/>
+              <a:p>
+                <a:r>
+                  <a:rPr lang="de-DE">
+                    <a:noFill/>
+                  </a:rPr>
+                  <a:t> </a:t>
+                </a:r>
+              </a:p>
+            </p:txBody>
+          </p:sp>
+        </mc:Fallback>
+      </mc:AlternateContent>
       <p:sp>
         <p:nvSpPr>
           <p:cNvPr id="4" name="Foliennummernplatzhalter 3">
             <a:extLst>
               <a:ext uri="{FF2B5EF4-FFF2-40B4-BE49-F238E27FC236}">
-                <a16:creationId xmlns:a16="http://schemas.microsoft.com/office/drawing/2014/main" id="{B0C0EBA0-2646-D649-137B-265D744CEEEB}"/>
+                <a16:creationId xmlns:a16="http://schemas.microsoft.com/office/drawing/2014/main" id="{9695D79B-140F-ED0F-12F1-D63F0CD77AA1}"/>
               </a:ext>
             </a:extLst>
           </p:cNvPr>
@@ -7337,10 +8527,1122 @@
           </a:p>
         </p:txBody>
       </p:sp>
+      <p:pic>
+        <p:nvPicPr>
+          <p:cNvPr id="5" name="Grafik 4">
+            <a:extLst>
+              <a:ext uri="{FF2B5EF4-FFF2-40B4-BE49-F238E27FC236}">
+                <a16:creationId xmlns:a16="http://schemas.microsoft.com/office/drawing/2014/main" id="{654FF782-4E84-BA12-3F7C-27131846C387}"/>
+              </a:ext>
+            </a:extLst>
+          </p:cNvPr>
+          <p:cNvPicPr>
+            <a:picLocks noChangeAspect="1"/>
+          </p:cNvPicPr>
+          <p:nvPr/>
+        </p:nvPicPr>
+        <p:blipFill>
+          <a:blip r:embed="rId3">
+            <a:extLst>
+              <a:ext uri="{96DAC541-7B7A-43D3-8B79-37D633B846F1}">
+                <asvg:svgBlip xmlns:asvg="http://schemas.microsoft.com/office/drawing/2016/SVG/main" r:embed="rId4"/>
+              </a:ext>
+            </a:extLst>
+          </a:blip>
+          <a:stretch>
+            <a:fillRect/>
+          </a:stretch>
+        </p:blipFill>
+        <p:spPr>
+          <a:xfrm>
+            <a:off x="7529324" y="2118473"/>
+            <a:ext cx="4662676" cy="3511838"/>
+          </a:xfrm>
+          <a:prstGeom prst="rect">
+            <a:avLst/>
+          </a:prstGeom>
+        </p:spPr>
+      </p:pic>
+      <p:sp>
+        <p:nvSpPr>
+          <p:cNvPr id="6" name="Textfeld 5">
+            <a:extLst>
+              <a:ext uri="{FF2B5EF4-FFF2-40B4-BE49-F238E27FC236}">
+                <a16:creationId xmlns:a16="http://schemas.microsoft.com/office/drawing/2014/main" id="{FD5F9AD0-872D-1DB9-C798-4EE5637DFA00}"/>
+              </a:ext>
+            </a:extLst>
+          </p:cNvPr>
+          <p:cNvSpPr txBox="1"/>
+          <p:nvPr/>
+        </p:nvSpPr>
+        <p:spPr>
+          <a:xfrm>
+            <a:off x="9293999" y="1749141"/>
+            <a:ext cx="1376402" cy="369332"/>
+          </a:xfrm>
+          <a:prstGeom prst="rect">
+            <a:avLst/>
+          </a:prstGeom>
+          <a:noFill/>
+        </p:spPr>
+        <p:txBody>
+          <a:bodyPr wrap="none" rtlCol="0">
+            <a:spAutoFit/>
+          </a:bodyPr>
+          <a:lstStyle/>
+          <a:p>
+            <a:r>
+              <a:rPr lang="de-DE" dirty="0"/>
+              <a:t>PT2 </a:t>
+            </a:r>
+            <a:r>
+              <a:rPr lang="de-DE" dirty="0" err="1"/>
+              <a:t>system</a:t>
+            </a:r>
+            <a:r>
+              <a:rPr lang="de-DE" dirty="0"/>
+              <a:t>:</a:t>
+            </a:r>
+          </a:p>
+        </p:txBody>
+      </p:sp>
+      <mc:AlternateContent xmlns:mc="http://schemas.openxmlformats.org/markup-compatibility/2006">
+        <mc:Choice xmlns:a14="http://schemas.microsoft.com/office/drawing/2010/main" Requires="a14">
+          <p:sp>
+            <p:nvSpPr>
+              <p:cNvPr id="7" name="Textfeld 6">
+                <a:extLst>
+                  <a:ext uri="{FF2B5EF4-FFF2-40B4-BE49-F238E27FC236}">
+                    <a16:creationId xmlns:a16="http://schemas.microsoft.com/office/drawing/2014/main" id="{17E210C8-E109-EF33-DEEA-6DE2BF901B68}"/>
+                  </a:ext>
+                </a:extLst>
+              </p:cNvPr>
+              <p:cNvSpPr txBox="1"/>
+              <p:nvPr/>
+            </p:nvSpPr>
+            <p:spPr>
+              <a:xfrm>
+                <a:off x="9435576" y="5581505"/>
+                <a:ext cx="1065420" cy="276999"/>
+              </a:xfrm>
+              <a:prstGeom prst="rect">
+                <a:avLst/>
+              </a:prstGeom>
+              <a:noFill/>
+            </p:spPr>
+            <p:txBody>
+              <a:bodyPr wrap="none" lIns="0" tIns="0" rIns="0" bIns="0" rtlCol="0">
+                <a:spAutoFit/>
+              </a:bodyPr>
+              <a:lstStyle/>
+              <a:p>
+                <a14:m>
+                  <m:oMathPara xmlns:m="http://schemas.openxmlformats.org/officeDocument/2006/math">
+                    <m:oMathParaPr>
+                      <m:jc m:val="centerGroup"/>
+                    </m:oMathParaPr>
+                    <m:oMath xmlns:m="http://schemas.openxmlformats.org/officeDocument/2006/math">
+                      <m:r>
+                        <m:rPr>
+                          <m:sty m:val="p"/>
+                        </m:rPr>
+                        <a:rPr lang="de-DE" b="0" i="0" smtClean="0">
+                          <a:latin typeface="Cambria Math" panose="02040503050406030204" pitchFamily="18" charset="0"/>
+                        </a:rPr>
+                        <m:t>Re</m:t>
+                      </m:r>
+                      <m:r>
+                        <a:rPr lang="de-DE" b="0" i="1" smtClean="0">
+                          <a:latin typeface="Cambria Math" panose="02040503050406030204" pitchFamily="18" charset="0"/>
+                        </a:rPr>
+                        <m:t>(</m:t>
+                      </m:r>
+                      <m:r>
+                        <a:rPr lang="de-DE" b="0" i="1" smtClean="0">
+                          <a:latin typeface="Cambria Math" panose="02040503050406030204" pitchFamily="18" charset="0"/>
+                        </a:rPr>
+                        <m:t>𝐿</m:t>
+                      </m:r>
+                      <m:d>
+                        <m:dPr>
+                          <m:ctrlPr>
+                            <a:rPr lang="de-DE" i="1">
+                              <a:latin typeface="Cambria Math" panose="02040503050406030204" pitchFamily="18" charset="0"/>
+                            </a:rPr>
+                          </m:ctrlPr>
+                        </m:dPr>
+                        <m:e>
+                          <m:r>
+                            <a:rPr lang="de-DE" i="1">
+                              <a:latin typeface="Cambria Math" panose="02040503050406030204" pitchFamily="18" charset="0"/>
+                            </a:rPr>
+                            <m:t>𝑗</m:t>
+                          </m:r>
+                          <m:r>
+                            <a:rPr lang="de-DE" i="1">
+                              <a:latin typeface="Cambria Math" panose="02040503050406030204" pitchFamily="18" charset="0"/>
+                              <a:ea typeface="Cambria Math" panose="02040503050406030204" pitchFamily="18" charset="0"/>
+                            </a:rPr>
+                            <m:t>𝜔</m:t>
+                          </m:r>
+                        </m:e>
+                      </m:d>
+                      <m:r>
+                        <a:rPr lang="de-DE" b="0" i="1" smtClean="0">
+                          <a:latin typeface="Cambria Math" panose="02040503050406030204" pitchFamily="18" charset="0"/>
+                        </a:rPr>
+                        <m:t>)</m:t>
+                      </m:r>
+                    </m:oMath>
+                  </m:oMathPara>
+                </a14:m>
+                <a:endParaRPr lang="de-DE" dirty="0"/>
+              </a:p>
+            </p:txBody>
+          </p:sp>
+        </mc:Choice>
+        <mc:Fallback>
+          <p:sp>
+            <p:nvSpPr>
+              <p:cNvPr id="7" name="Textfeld 6">
+                <a:extLst>
+                  <a:ext uri="{FF2B5EF4-FFF2-40B4-BE49-F238E27FC236}">
+                    <a16:creationId xmlns:a16="http://schemas.microsoft.com/office/drawing/2014/main" id="{17E210C8-E109-EF33-DEEA-6DE2BF901B68}"/>
+                  </a:ext>
+                </a:extLst>
+              </p:cNvPr>
+              <p:cNvSpPr txBox="1">
+                <a:spLocks noRot="1" noChangeAspect="1" noMove="1" noResize="1" noEditPoints="1" noAdjustHandles="1" noChangeArrowheads="1" noChangeShapeType="1" noTextEdit="1"/>
+              </p:cNvSpPr>
+              <p:nvPr/>
+            </p:nvSpPr>
+            <p:spPr>
+              <a:xfrm>
+                <a:off x="9435576" y="5581505"/>
+                <a:ext cx="1065420" cy="276999"/>
+              </a:xfrm>
+              <a:prstGeom prst="rect">
+                <a:avLst/>
+              </a:prstGeom>
+              <a:blipFill>
+                <a:blip r:embed="rId5"/>
+                <a:stretch>
+                  <a:fillRect l="-5882" r="-7059" b="-34783"/>
+                </a:stretch>
+              </a:blipFill>
+            </p:spPr>
+            <p:txBody>
+              <a:bodyPr/>
+              <a:lstStyle/>
+              <a:p>
+                <a:r>
+                  <a:rPr lang="de-DE">
+                    <a:noFill/>
+                  </a:rPr>
+                  <a:t> </a:t>
+                </a:r>
+              </a:p>
+            </p:txBody>
+          </p:sp>
+        </mc:Fallback>
+      </mc:AlternateContent>
+      <mc:AlternateContent xmlns:mc="http://schemas.openxmlformats.org/markup-compatibility/2006">
+        <mc:Choice xmlns:a14="http://schemas.microsoft.com/office/drawing/2010/main" Requires="a14">
+          <p:sp>
+            <p:nvSpPr>
+              <p:cNvPr id="8" name="Textfeld 7">
+                <a:extLst>
+                  <a:ext uri="{FF2B5EF4-FFF2-40B4-BE49-F238E27FC236}">
+                    <a16:creationId xmlns:a16="http://schemas.microsoft.com/office/drawing/2014/main" id="{D0FC0F33-8594-06B5-7542-62F48ACACB3A}"/>
+                  </a:ext>
+                </a:extLst>
+              </p:cNvPr>
+              <p:cNvSpPr txBox="1"/>
+              <p:nvPr/>
+            </p:nvSpPr>
+            <p:spPr>
+              <a:xfrm rot="16200000">
+                <a:off x="7127099" y="3735892"/>
+                <a:ext cx="1081450" cy="276999"/>
+              </a:xfrm>
+              <a:prstGeom prst="rect">
+                <a:avLst/>
+              </a:prstGeom>
+              <a:noFill/>
+            </p:spPr>
+            <p:txBody>
+              <a:bodyPr wrap="none" lIns="0" tIns="0" rIns="0" bIns="0" rtlCol="0">
+                <a:spAutoFit/>
+              </a:bodyPr>
+              <a:lstStyle/>
+              <a:p>
+                <a14:m>
+                  <m:oMathPara xmlns:m="http://schemas.openxmlformats.org/officeDocument/2006/math">
+                    <m:oMathParaPr>
+                      <m:jc m:val="centerGroup"/>
+                    </m:oMathParaPr>
+                    <m:oMath xmlns:m="http://schemas.openxmlformats.org/officeDocument/2006/math">
+                      <m:r>
+                        <m:rPr>
+                          <m:sty m:val="p"/>
+                        </m:rPr>
+                        <a:rPr lang="de-DE" b="0" i="0" smtClean="0">
+                          <a:latin typeface="Cambria Math" panose="02040503050406030204" pitchFamily="18" charset="0"/>
+                        </a:rPr>
+                        <m:t>Im</m:t>
+                      </m:r>
+                      <m:r>
+                        <a:rPr lang="de-DE" b="0" i="1" smtClean="0">
+                          <a:latin typeface="Cambria Math" panose="02040503050406030204" pitchFamily="18" charset="0"/>
+                        </a:rPr>
+                        <m:t>(</m:t>
+                      </m:r>
+                      <m:r>
+                        <a:rPr lang="de-DE" b="0" i="1" smtClean="0">
+                          <a:latin typeface="Cambria Math" panose="02040503050406030204" pitchFamily="18" charset="0"/>
+                        </a:rPr>
+                        <m:t>𝐿</m:t>
+                      </m:r>
+                      <m:d>
+                        <m:dPr>
+                          <m:ctrlPr>
+                            <a:rPr lang="de-DE" i="1">
+                              <a:latin typeface="Cambria Math" panose="02040503050406030204" pitchFamily="18" charset="0"/>
+                            </a:rPr>
+                          </m:ctrlPr>
+                        </m:dPr>
+                        <m:e>
+                          <m:r>
+                            <a:rPr lang="de-DE" i="1">
+                              <a:latin typeface="Cambria Math" panose="02040503050406030204" pitchFamily="18" charset="0"/>
+                            </a:rPr>
+                            <m:t>𝑗</m:t>
+                          </m:r>
+                          <m:r>
+                            <a:rPr lang="de-DE" i="1">
+                              <a:latin typeface="Cambria Math" panose="02040503050406030204" pitchFamily="18" charset="0"/>
+                              <a:ea typeface="Cambria Math" panose="02040503050406030204" pitchFamily="18" charset="0"/>
+                            </a:rPr>
+                            <m:t>𝜔</m:t>
+                          </m:r>
+                        </m:e>
+                      </m:d>
+                      <m:r>
+                        <a:rPr lang="de-DE" b="0" i="1" smtClean="0">
+                          <a:latin typeface="Cambria Math" panose="02040503050406030204" pitchFamily="18" charset="0"/>
+                        </a:rPr>
+                        <m:t>)</m:t>
+                      </m:r>
+                    </m:oMath>
+                  </m:oMathPara>
+                </a14:m>
+                <a:endParaRPr lang="de-DE" dirty="0"/>
+              </a:p>
+            </p:txBody>
+          </p:sp>
+        </mc:Choice>
+        <mc:Fallback>
+          <p:sp>
+            <p:nvSpPr>
+              <p:cNvPr id="8" name="Textfeld 7">
+                <a:extLst>
+                  <a:ext uri="{FF2B5EF4-FFF2-40B4-BE49-F238E27FC236}">
+                    <a16:creationId xmlns:a16="http://schemas.microsoft.com/office/drawing/2014/main" id="{D0FC0F33-8594-06B5-7542-62F48ACACB3A}"/>
+                  </a:ext>
+                </a:extLst>
+              </p:cNvPr>
+              <p:cNvSpPr txBox="1">
+                <a:spLocks noRot="1" noChangeAspect="1" noMove="1" noResize="1" noEditPoints="1" noAdjustHandles="1" noChangeArrowheads="1" noChangeShapeType="1" noTextEdit="1"/>
+              </p:cNvSpPr>
+              <p:nvPr/>
+            </p:nvSpPr>
+            <p:spPr>
+              <a:xfrm rot="16200000">
+                <a:off x="7127099" y="3735892"/>
+                <a:ext cx="1081450" cy="276999"/>
+              </a:xfrm>
+              <a:prstGeom prst="rect">
+                <a:avLst/>
+              </a:prstGeom>
+              <a:blipFill>
+                <a:blip r:embed="rId6"/>
+                <a:stretch>
+                  <a:fillRect t="-8140" r="-34783" b="-4651"/>
+                </a:stretch>
+              </a:blipFill>
+            </p:spPr>
+            <p:txBody>
+              <a:bodyPr/>
+              <a:lstStyle/>
+              <a:p>
+                <a:r>
+                  <a:rPr lang="de-DE">
+                    <a:noFill/>
+                  </a:rPr>
+                  <a:t> </a:t>
+                </a:r>
+              </a:p>
+            </p:txBody>
+          </p:sp>
+        </mc:Fallback>
+      </mc:AlternateContent>
     </p:spTree>
     <p:extLst>
       <p:ext uri="{BB962C8B-B14F-4D97-AF65-F5344CB8AC3E}">
-        <p14:creationId xmlns:p14="http://schemas.microsoft.com/office/powerpoint/2010/main" val="4254092505"/>
+        <p14:creationId xmlns:p14="http://schemas.microsoft.com/office/powerpoint/2010/main" val="1043321803"/>
+      </p:ext>
+    </p:extLst>
+  </p:cSld>
+  <p:clrMapOvr>
+    <a:masterClrMapping/>
+  </p:clrMapOvr>
+</p:sld>
+</file>
+
+<file path=ppt/slides/slide19.xml><?xml version="1.0" encoding="utf-8"?>
+<p:sld xmlns:a="http://schemas.openxmlformats.org/drawingml/2006/main" xmlns:r="http://schemas.openxmlformats.org/officeDocument/2006/relationships" xmlns:p="http://schemas.openxmlformats.org/presentationml/2006/main">
+  <p:cSld>
+    <p:spTree>
+      <p:nvGrpSpPr>
+        <p:cNvPr id="1" name=""/>
+        <p:cNvGrpSpPr/>
+        <p:nvPr/>
+      </p:nvGrpSpPr>
+      <p:grpSpPr>
+        <a:xfrm>
+          <a:off x="0" y="0"/>
+          <a:ext cx="0" cy="0"/>
+          <a:chOff x="0" y="0"/>
+          <a:chExt cx="0" cy="0"/>
+        </a:xfrm>
+      </p:grpSpPr>
+      <p:sp>
+        <p:nvSpPr>
+          <p:cNvPr id="2" name="Titel 1">
+            <a:extLst>
+              <a:ext uri="{FF2B5EF4-FFF2-40B4-BE49-F238E27FC236}">
+                <a16:creationId xmlns:a16="http://schemas.microsoft.com/office/drawing/2014/main" id="{839D0819-63A4-5FE2-C3BC-F96F50CE9BCA}"/>
+              </a:ext>
+            </a:extLst>
+          </p:cNvPr>
+          <p:cNvSpPr>
+            <a:spLocks noGrp="1"/>
+          </p:cNvSpPr>
+          <p:nvPr>
+            <p:ph type="title"/>
+          </p:nvPr>
+        </p:nvSpPr>
+        <p:spPr/>
+        <p:txBody>
+          <a:bodyPr/>
+          <a:lstStyle/>
+          <a:p>
+            <a:r>
+              <a:rPr lang="de-DE" dirty="0" err="1"/>
+              <a:t>Nyquist</a:t>
+            </a:r>
+            <a:r>
+              <a:rPr lang="de-DE" dirty="0"/>
+              <a:t> Formula</a:t>
+            </a:r>
+          </a:p>
+        </p:txBody>
+      </p:sp>
+      <mc:AlternateContent xmlns:mc="http://schemas.openxmlformats.org/markup-compatibility/2006">
+        <mc:Choice xmlns:a14="http://schemas.microsoft.com/office/drawing/2010/main" Requires="a14">
+          <p:sp>
+            <p:nvSpPr>
+              <p:cNvPr id="3" name="Inhaltsplatzhalter 2">
+                <a:extLst>
+                  <a:ext uri="{FF2B5EF4-FFF2-40B4-BE49-F238E27FC236}">
+                    <a16:creationId xmlns:a16="http://schemas.microsoft.com/office/drawing/2014/main" id="{7DF119EF-E5CD-E6C3-DBEF-451E2BB0BEA6}"/>
+                  </a:ext>
+                </a:extLst>
+              </p:cNvPr>
+              <p:cNvSpPr>
+                <a:spLocks noGrp="1"/>
+              </p:cNvSpPr>
+              <p:nvPr>
+                <p:ph idx="1"/>
+              </p:nvPr>
+            </p:nvSpPr>
+            <p:spPr/>
+            <p:txBody>
+              <a:bodyPr>
+                <a:normAutofit/>
+              </a:bodyPr>
+              <a:lstStyle/>
+              <a:p>
+                <a:pPr marL="0" indent="0">
+                  <a:buNone/>
+                </a:pPr>
+                <a:r>
+                  <a:rPr lang="de-DE" sz="2400" dirty="0"/>
+                  <a:t>Number </a:t>
+                </a:r>
+                <a:r>
+                  <a:rPr lang="de-DE" sz="2400" dirty="0" err="1"/>
+                  <a:t>of</a:t>
+                </a:r>
+                <a:r>
+                  <a:rPr lang="de-DE" sz="2400" dirty="0"/>
+                  <a:t> </a:t>
+                </a:r>
+                <a:r>
+                  <a:rPr lang="de-DE" sz="2400" dirty="0" err="1"/>
+                  <a:t>encirclements</a:t>
+                </a:r>
+                <a:r>
+                  <a:rPr lang="de-DE" sz="2400" dirty="0"/>
+                  <a:t> </a:t>
+                </a:r>
+                <a:r>
+                  <a:rPr lang="de-DE" sz="2400" dirty="0">
+                    <a:sym typeface="Wingdings" pitchFamily="2" charset="2"/>
+                  </a:rPr>
+                  <a:t></a:t>
+                </a:r>
+                <a:r>
+                  <a:rPr lang="de-DE" sz="2400" dirty="0"/>
+                  <a:t> </a:t>
+                </a:r>
+                <a:r>
+                  <a:rPr lang="de-DE" sz="2400" dirty="0" err="1"/>
+                  <a:t>how</a:t>
+                </a:r>
+                <a:r>
+                  <a:rPr lang="de-DE" sz="2400" dirty="0"/>
+                  <a:t> </a:t>
+                </a:r>
+                <a:r>
+                  <a:rPr lang="de-DE" sz="2400" dirty="0" err="1"/>
+                  <a:t>many</a:t>
+                </a:r>
+                <a:r>
+                  <a:rPr lang="de-DE" sz="2400" dirty="0"/>
+                  <a:t> </a:t>
+                </a:r>
+                <a:r>
+                  <a:rPr lang="de-DE" sz="2400" dirty="0" err="1"/>
+                  <a:t>closed</a:t>
+                </a:r>
+                <a:r>
+                  <a:rPr lang="de-DE" sz="2400" dirty="0"/>
+                  <a:t>-loop </a:t>
+                </a:r>
+                <a:r>
+                  <a:rPr lang="de-DE" sz="2400" dirty="0" err="1"/>
+                  <a:t>poles</a:t>
+                </a:r>
+                <a:r>
+                  <a:rPr lang="de-DE" sz="2400" dirty="0"/>
+                  <a:t> in RHP</a:t>
+                </a:r>
+              </a:p>
+              <a:p>
+                <a:pPr marL="0" indent="0">
+                  <a:buNone/>
+                </a:pPr>
+                <a:endParaRPr lang="de-DE" sz="2400" dirty="0"/>
+              </a:p>
+              <a:p>
+                <a14:m>
+                  <m:oMath xmlns:m="http://schemas.openxmlformats.org/officeDocument/2006/math">
+                    <m:r>
+                      <a:rPr lang="de-DE" sz="2400" i="1">
+                        <a:latin typeface="Cambria Math" panose="02040503050406030204" pitchFamily="18" charset="0"/>
+                      </a:rPr>
+                      <m:t>𝑃</m:t>
+                    </m:r>
+                    <m:r>
+                      <a:rPr lang="de-DE" sz="2400" b="0" i="0" smtClean="0">
+                        <a:latin typeface="Cambria Math" panose="02040503050406030204" pitchFamily="18" charset="0"/>
+                      </a:rPr>
+                      <m:t>=</m:t>
+                    </m:r>
+                  </m:oMath>
+                </a14:m>
+                <a:r>
+                  <a:rPr lang="de-DE" sz="2400" dirty="0"/>
+                  <a:t> </a:t>
+                </a:r>
+                <a:r>
+                  <a:rPr lang="de-DE" sz="2400" dirty="0" err="1"/>
+                  <a:t>number</a:t>
+                </a:r>
+                <a:r>
+                  <a:rPr lang="de-DE" sz="2400" dirty="0"/>
+                  <a:t> </a:t>
+                </a:r>
+                <a:r>
+                  <a:rPr lang="de-DE" sz="2400" dirty="0" err="1"/>
+                  <a:t>of</a:t>
+                </a:r>
+                <a:r>
+                  <a:rPr lang="de-DE" sz="2400" dirty="0"/>
+                  <a:t> RHP </a:t>
+                </a:r>
+                <a:r>
+                  <a:rPr lang="de-DE" sz="2400" dirty="0" err="1"/>
+                  <a:t>poles</a:t>
+                </a:r>
+                <a:r>
+                  <a:rPr lang="de-DE" sz="2400" dirty="0"/>
+                  <a:t> </a:t>
+                </a:r>
+                <a:r>
+                  <a:rPr lang="de-DE" sz="2400" dirty="0" err="1"/>
+                  <a:t>of</a:t>
+                </a:r>
+                <a:r>
+                  <a:rPr lang="de-DE" sz="2400" dirty="0"/>
+                  <a:t> </a:t>
+                </a:r>
+                <a14:m>
+                  <m:oMath xmlns:m="http://schemas.openxmlformats.org/officeDocument/2006/math">
+                    <m:r>
+                      <a:rPr lang="de-DE" sz="2400" i="1">
+                        <a:latin typeface="Cambria Math" panose="02040503050406030204" pitchFamily="18" charset="0"/>
+                      </a:rPr>
+                      <m:t>𝐿</m:t>
+                    </m:r>
+                    <m:r>
+                      <a:rPr lang="de-DE" sz="2400" i="1">
+                        <a:latin typeface="Cambria Math" panose="02040503050406030204" pitchFamily="18" charset="0"/>
+                      </a:rPr>
+                      <m:t>(</m:t>
+                    </m:r>
+                    <m:r>
+                      <a:rPr lang="de-DE" sz="2400" i="1">
+                        <a:latin typeface="Cambria Math" panose="02040503050406030204" pitchFamily="18" charset="0"/>
+                      </a:rPr>
+                      <m:t>𝑠</m:t>
+                    </m:r>
+                    <m:r>
+                      <a:rPr lang="de-DE" sz="2400" b="0" i="1" smtClean="0">
+                        <a:latin typeface="Cambria Math" panose="02040503050406030204" pitchFamily="18" charset="0"/>
+                      </a:rPr>
+                      <m:t>)</m:t>
+                    </m:r>
+                  </m:oMath>
+                </a14:m>
+                <a:endParaRPr lang="de-DE" sz="2400" dirty="0"/>
+              </a:p>
+              <a:p>
+                <a14:m>
+                  <m:oMath xmlns:m="http://schemas.openxmlformats.org/officeDocument/2006/math">
+                    <m:r>
+                      <a:rPr lang="de-DE" sz="2400" i="1">
+                        <a:latin typeface="Cambria Math" panose="02040503050406030204" pitchFamily="18" charset="0"/>
+                      </a:rPr>
+                      <m:t>𝑍</m:t>
+                    </m:r>
+                    <m:r>
+                      <a:rPr lang="de-DE" sz="2400" b="0" i="0" smtClean="0">
+                        <a:latin typeface="Cambria Math" panose="02040503050406030204" pitchFamily="18" charset="0"/>
+                      </a:rPr>
+                      <m:t>=</m:t>
+                    </m:r>
+                  </m:oMath>
+                </a14:m>
+                <a:r>
+                  <a:rPr lang="de-DE" sz="2400" dirty="0"/>
+                  <a:t> </a:t>
+                </a:r>
+                <a:r>
+                  <a:rPr lang="de-DE" sz="2400" dirty="0" err="1"/>
+                  <a:t>number</a:t>
+                </a:r>
+                <a:r>
+                  <a:rPr lang="de-DE" sz="2400" dirty="0"/>
+                  <a:t> </a:t>
+                </a:r>
+                <a:r>
+                  <a:rPr lang="de-DE" sz="2400" dirty="0" err="1"/>
+                  <a:t>of</a:t>
+                </a:r>
+                <a:r>
+                  <a:rPr lang="de-DE" sz="2400" dirty="0"/>
+                  <a:t> </a:t>
+                </a:r>
+                <a:r>
+                  <a:rPr lang="de-DE" sz="2400" dirty="0" err="1"/>
+                  <a:t>closed</a:t>
+                </a:r>
+                <a:r>
+                  <a:rPr lang="de-DE" sz="2400" dirty="0"/>
+                  <a:t>-loop </a:t>
+                </a:r>
+                <a:r>
+                  <a:rPr lang="de-DE" sz="2400" dirty="0" err="1"/>
+                  <a:t>poles</a:t>
+                </a:r>
+                <a:r>
+                  <a:rPr lang="de-DE" sz="2400" dirty="0"/>
+                  <a:t> in RHP (</a:t>
+                </a:r>
+                <a14:m>
+                  <m:oMath xmlns:m="http://schemas.openxmlformats.org/officeDocument/2006/math">
+                    <m:r>
+                      <a:rPr lang="de-DE" sz="2400" i="1">
+                        <a:latin typeface="Cambria Math" panose="02040503050406030204" pitchFamily="18" charset="0"/>
+                      </a:rPr>
+                      <m:t>𝐿</m:t>
+                    </m:r>
+                    <m:r>
+                      <a:rPr lang="de-DE" sz="2400" i="1">
+                        <a:latin typeface="Cambria Math" panose="02040503050406030204" pitchFamily="18" charset="0"/>
+                      </a:rPr>
+                      <m:t>(</m:t>
+                    </m:r>
+                    <m:r>
+                      <a:rPr lang="de-DE" sz="2400" i="1">
+                        <a:latin typeface="Cambria Math" panose="02040503050406030204" pitchFamily="18" charset="0"/>
+                      </a:rPr>
+                      <m:t>𝑠</m:t>
+                    </m:r>
+                    <m:r>
+                      <a:rPr lang="de-DE" sz="2400" i="1">
+                        <a:latin typeface="Cambria Math" panose="02040503050406030204" pitchFamily="18" charset="0"/>
+                      </a:rPr>
+                      <m:t>)=−1</m:t>
+                    </m:r>
+                  </m:oMath>
+                </a14:m>
+                <a:r>
+                  <a:rPr lang="de-DE" sz="2400" dirty="0"/>
+                  <a:t> )</a:t>
+                </a:r>
+              </a:p>
+              <a:p>
+                <a14:m>
+                  <m:oMath xmlns:m="http://schemas.openxmlformats.org/officeDocument/2006/math">
+                    <m:r>
+                      <a:rPr lang="de-DE" sz="2400" i="1">
+                        <a:latin typeface="Cambria Math" panose="02040503050406030204" pitchFamily="18" charset="0"/>
+                      </a:rPr>
+                      <m:t>𝑁</m:t>
+                    </m:r>
+                    <m:r>
+                      <a:rPr lang="de-DE" sz="2400" b="0" i="0" smtClean="0">
+                        <a:latin typeface="Cambria Math" panose="02040503050406030204" pitchFamily="18" charset="0"/>
+                      </a:rPr>
+                      <m:t>=</m:t>
+                    </m:r>
+                  </m:oMath>
+                </a14:m>
+                <a:r>
+                  <a:rPr lang="de-DE" sz="2400" dirty="0"/>
+                  <a:t> </a:t>
+                </a:r>
+                <a:r>
+                  <a:rPr lang="de-DE" sz="2400" dirty="0" err="1"/>
+                  <a:t>number</a:t>
+                </a:r>
+                <a:r>
+                  <a:rPr lang="de-DE" sz="2400" dirty="0"/>
+                  <a:t> </a:t>
+                </a:r>
+                <a:r>
+                  <a:rPr lang="de-DE" sz="2400" dirty="0" err="1"/>
+                  <a:t>of</a:t>
+                </a:r>
+                <a:r>
+                  <a:rPr lang="de-DE" sz="2400" dirty="0"/>
+                  <a:t> </a:t>
+                </a:r>
+                <a:r>
+                  <a:rPr lang="de-DE" sz="2400" dirty="0" err="1"/>
+                  <a:t>encirclements</a:t>
+                </a:r>
+                <a:r>
+                  <a:rPr lang="de-DE" sz="2400" dirty="0"/>
+                  <a:t> </a:t>
+                </a:r>
+                <a:r>
+                  <a:rPr lang="de-DE" sz="2400" dirty="0" err="1"/>
+                  <a:t>of</a:t>
+                </a:r>
+                <a:r>
+                  <a:rPr lang="de-DE" sz="2400" dirty="0"/>
+                  <a:t> </a:t>
+                </a:r>
+                <a14:m>
+                  <m:oMath xmlns:m="http://schemas.openxmlformats.org/officeDocument/2006/math">
+                    <m:r>
+                      <a:rPr lang="de-DE" sz="2400" b="0" i="1" smtClean="0">
+                        <a:latin typeface="Cambria Math" panose="02040503050406030204" pitchFamily="18" charset="0"/>
+                      </a:rPr>
+                      <m:t>−1</m:t>
+                    </m:r>
+                  </m:oMath>
+                </a14:m>
+                <a:r>
+                  <a:rPr lang="de-DE" sz="2400" dirty="0"/>
+                  <a:t> </a:t>
+                </a:r>
+                <a:r>
+                  <a:rPr lang="de-DE" sz="2400" dirty="0" err="1"/>
+                  <a:t>by</a:t>
+                </a:r>
+                <a:r>
+                  <a:rPr lang="de-DE" sz="2400" dirty="0"/>
+                  <a:t> </a:t>
+                </a:r>
+                <a:r>
+                  <a:rPr lang="de-DE" sz="2400" dirty="0" err="1"/>
+                  <a:t>the</a:t>
+                </a:r>
+                <a:r>
+                  <a:rPr lang="de-DE" sz="2400" dirty="0"/>
+                  <a:t> </a:t>
+                </a:r>
+                <a:r>
+                  <a:rPr lang="de-DE" sz="2400" dirty="0" err="1"/>
+                  <a:t>Nyquist</a:t>
+                </a:r>
+                <a:r>
+                  <a:rPr lang="de-DE" sz="2400" dirty="0"/>
+                  <a:t> </a:t>
+                </a:r>
+                <a:r>
+                  <a:rPr lang="de-DE" sz="2400" dirty="0" err="1"/>
+                  <a:t>plot</a:t>
+                </a:r>
+                <a:r>
+                  <a:rPr lang="de-DE" sz="2400" dirty="0"/>
+                  <a:t> </a:t>
+                </a:r>
+                <a:r>
+                  <a:rPr lang="de-DE" sz="2400" dirty="0" err="1"/>
+                  <a:t>of</a:t>
+                </a:r>
+                <a:r>
+                  <a:rPr lang="de-DE" sz="2400" dirty="0"/>
+                  <a:t> </a:t>
+                </a:r>
+                <a14:m>
+                  <m:oMath xmlns:m="http://schemas.openxmlformats.org/officeDocument/2006/math">
+                    <m:r>
+                      <a:rPr lang="de-DE" sz="2400" i="1">
+                        <a:latin typeface="Cambria Math" panose="02040503050406030204" pitchFamily="18" charset="0"/>
+                      </a:rPr>
+                      <m:t>𝐿</m:t>
+                    </m:r>
+                    <m:r>
+                      <a:rPr lang="de-DE" sz="2400" i="1">
+                        <a:latin typeface="Cambria Math" panose="02040503050406030204" pitchFamily="18" charset="0"/>
+                      </a:rPr>
+                      <m:t>(</m:t>
+                    </m:r>
+                    <m:r>
+                      <a:rPr lang="de-DE" sz="2400" i="1">
+                        <a:latin typeface="Cambria Math" panose="02040503050406030204" pitchFamily="18" charset="0"/>
+                      </a:rPr>
+                      <m:t>𝑠</m:t>
+                    </m:r>
+                    <m:r>
+                      <a:rPr lang="de-DE" sz="2400" b="0" i="1" smtClean="0">
+                        <a:latin typeface="Cambria Math" panose="02040503050406030204" pitchFamily="18" charset="0"/>
+                      </a:rPr>
+                      <m:t>)</m:t>
+                    </m:r>
+                  </m:oMath>
+                </a14:m>
+                <a:r>
+                  <a:rPr lang="de-DE" sz="2400" dirty="0"/>
+                  <a:t>, </a:t>
+                </a:r>
+                <a:r>
+                  <a:rPr lang="de-DE" sz="2400" dirty="0" err="1"/>
+                  <a:t>where</a:t>
+                </a:r>
+                <a:r>
+                  <a:rPr lang="de-DE" sz="2400" dirty="0"/>
+                  <a:t> </a:t>
+                </a:r>
+                <a:r>
+                  <a:rPr lang="de-DE" sz="2400" dirty="0" err="1"/>
+                  <a:t>the</a:t>
+                </a:r>
+                <a:r>
+                  <a:rPr lang="de-DE" sz="2400" dirty="0"/>
+                  <a:t> </a:t>
+                </a:r>
+                <a:r>
+                  <a:rPr lang="de-DE" sz="2400" dirty="0" err="1"/>
+                  <a:t>sign</a:t>
+                </a:r>
+                <a:r>
+                  <a:rPr lang="de-DE" sz="2400" dirty="0"/>
+                  <a:t> </a:t>
+                </a:r>
+                <a:r>
+                  <a:rPr lang="de-DE" sz="2400" dirty="0" err="1"/>
+                  <a:t>reflects</a:t>
+                </a:r>
+                <a:r>
+                  <a:rPr lang="de-DE" sz="2400" dirty="0"/>
+                  <a:t> </a:t>
+                </a:r>
+                <a:r>
+                  <a:rPr lang="de-DE" sz="2400" dirty="0" err="1"/>
+                  <a:t>the</a:t>
+                </a:r>
+                <a:r>
+                  <a:rPr lang="de-DE" sz="2400" dirty="0"/>
+                  <a:t> </a:t>
+                </a:r>
+                <a:r>
+                  <a:rPr lang="de-DE" sz="2400" dirty="0" err="1"/>
+                  <a:t>encirclement</a:t>
+                </a:r>
+                <a:r>
+                  <a:rPr lang="de-DE" sz="2400" dirty="0"/>
+                  <a:t> </a:t>
+                </a:r>
+                <a:r>
+                  <a:rPr lang="de-DE" sz="2400" dirty="0" err="1"/>
+                  <a:t>direction</a:t>
+                </a:r>
+                <a:endParaRPr lang="de-DE" sz="2400" dirty="0"/>
+              </a:p>
+              <a:p>
+                <a:pPr marL="0" indent="0">
+                  <a:buNone/>
+                </a:pPr>
+                <a:endParaRPr lang="de-DE" sz="2400" dirty="0"/>
+              </a:p>
+              <a:p>
+                <a:pPr marL="0" indent="0">
+                  <a:buNone/>
+                </a:pPr>
+                <a14:m>
+                  <m:oMathPara xmlns:m="http://schemas.openxmlformats.org/officeDocument/2006/math">
+                    <m:oMathParaPr>
+                      <m:jc m:val="centerGroup"/>
+                    </m:oMathParaPr>
+                    <m:oMath xmlns:m="http://schemas.openxmlformats.org/officeDocument/2006/math">
+                      <m:r>
+                        <a:rPr lang="de-DE" sz="2400" b="0" i="1" smtClean="0">
+                          <a:latin typeface="Cambria Math" panose="02040503050406030204" pitchFamily="18" charset="0"/>
+                        </a:rPr>
+                        <m:t>𝑍</m:t>
+                      </m:r>
+                      <m:r>
+                        <a:rPr lang="de-DE" sz="2400" b="0" i="1" smtClean="0">
+                          <a:latin typeface="Cambria Math" panose="02040503050406030204" pitchFamily="18" charset="0"/>
+                        </a:rPr>
+                        <m:t>=</m:t>
+                      </m:r>
+                      <m:r>
+                        <a:rPr lang="de-DE" sz="2400" b="0" i="1" smtClean="0">
+                          <a:latin typeface="Cambria Math" panose="02040503050406030204" pitchFamily="18" charset="0"/>
+                        </a:rPr>
+                        <m:t>𝑁</m:t>
+                      </m:r>
+                      <m:r>
+                        <a:rPr lang="de-DE" sz="2400" b="0" i="1" smtClean="0">
+                          <a:latin typeface="Cambria Math" panose="02040503050406030204" pitchFamily="18" charset="0"/>
+                        </a:rPr>
+                        <m:t>+</m:t>
+                      </m:r>
+                      <m:r>
+                        <a:rPr lang="de-DE" sz="2400" b="0" i="1" smtClean="0">
+                          <a:latin typeface="Cambria Math" panose="02040503050406030204" pitchFamily="18" charset="0"/>
+                        </a:rPr>
+                        <m:t>𝑃</m:t>
+                      </m:r>
+                    </m:oMath>
+                  </m:oMathPara>
+                </a14:m>
+                <a:endParaRPr lang="de-DE" sz="2400" dirty="0"/>
+              </a:p>
+              <a:p>
+                <a:pPr marL="0" indent="0">
+                  <a:buNone/>
+                </a:pPr>
+                <a:endParaRPr lang="de-DE" sz="2400" dirty="0"/>
+              </a:p>
+              <a:p>
+                <a:pPr marL="0" indent="0">
+                  <a:buNone/>
+                </a:pPr>
+                <a:r>
+                  <a:rPr lang="de-DE" sz="2400" dirty="0">
+                    <a:sym typeface="Wingdings" pitchFamily="2" charset="2"/>
+                  </a:rPr>
+                  <a:t> </a:t>
+                </a:r>
+                <a:r>
+                  <a:rPr lang="de-DE" sz="2400" dirty="0"/>
+                  <a:t>An </a:t>
+                </a:r>
+                <a:r>
+                  <a:rPr lang="de-DE" sz="2400" dirty="0" err="1"/>
+                  <a:t>unstable</a:t>
+                </a:r>
+                <a:r>
+                  <a:rPr lang="de-DE" sz="2400" dirty="0"/>
+                  <a:t> plant (e.g., </a:t>
+                </a:r>
+                <a14:m>
+                  <m:oMath xmlns:m="http://schemas.openxmlformats.org/officeDocument/2006/math">
+                    <m:r>
+                      <a:rPr lang="de-DE" sz="2400" i="1">
+                        <a:latin typeface="Cambria Math" panose="02040503050406030204" pitchFamily="18" charset="0"/>
+                      </a:rPr>
+                      <m:t>𝑃</m:t>
+                    </m:r>
+                    <m:r>
+                      <a:rPr lang="de-DE" sz="2400" b="0" i="1" smtClean="0">
+                        <a:latin typeface="Cambria Math" panose="02040503050406030204" pitchFamily="18" charset="0"/>
+                      </a:rPr>
+                      <m:t>=1</m:t>
+                    </m:r>
+                  </m:oMath>
+                </a14:m>
+                <a:r>
+                  <a:rPr lang="de-DE" sz="2400" dirty="0"/>
+                  <a:t>) </a:t>
+                </a:r>
+                <a:r>
+                  <a:rPr lang="de-DE" sz="2400" dirty="0" err="1"/>
+                  <a:t>can</a:t>
+                </a:r>
+                <a:r>
+                  <a:rPr lang="de-DE" sz="2400" dirty="0"/>
+                  <a:t> </a:t>
+                </a:r>
+                <a:r>
+                  <a:rPr lang="de-DE" sz="2400" dirty="0" err="1"/>
+                  <a:t>be</a:t>
+                </a:r>
+                <a:r>
+                  <a:rPr lang="de-DE" sz="2400" dirty="0"/>
+                  <a:t> </a:t>
+                </a:r>
+                <a:r>
+                  <a:rPr lang="de-DE" sz="2400" dirty="0" err="1"/>
+                  <a:t>stabilized</a:t>
+                </a:r>
+                <a:r>
+                  <a:rPr lang="de-DE" sz="2400" dirty="0"/>
+                  <a:t> </a:t>
+                </a:r>
+                <a:r>
+                  <a:rPr lang="de-DE" sz="2400" dirty="0" err="1"/>
+                  <a:t>by</a:t>
+                </a:r>
+                <a:r>
+                  <a:rPr lang="de-DE" sz="2400" dirty="0"/>
+                  <a:t> </a:t>
+                </a:r>
+                <a:r>
+                  <a:rPr lang="de-DE" sz="2400" dirty="0" err="1"/>
+                  <a:t>feedback</a:t>
+                </a:r>
+                <a:r>
+                  <a:rPr lang="de-DE" sz="2400" dirty="0"/>
+                  <a:t> (e.g., </a:t>
+                </a:r>
+                <a14:m>
+                  <m:oMath xmlns:m="http://schemas.openxmlformats.org/officeDocument/2006/math">
+                    <m:r>
+                      <a:rPr lang="de-DE" sz="2400" i="1">
+                        <a:latin typeface="Cambria Math" panose="02040503050406030204" pitchFamily="18" charset="0"/>
+                      </a:rPr>
+                      <m:t>𝑁</m:t>
+                    </m:r>
+                    <m:r>
+                      <a:rPr lang="de-DE" sz="2400" b="0" i="1" smtClean="0">
+                        <a:latin typeface="Cambria Math" panose="02040503050406030204" pitchFamily="18" charset="0"/>
+                      </a:rPr>
+                      <m:t>=−1</m:t>
+                    </m:r>
+                  </m:oMath>
+                </a14:m>
+                <a:r>
+                  <a:rPr lang="de-DE" sz="2400" dirty="0"/>
+                  <a:t>).</a:t>
+                </a:r>
+              </a:p>
+            </p:txBody>
+          </p:sp>
+        </mc:Choice>
+        <mc:Fallback>
+          <p:sp>
+            <p:nvSpPr>
+              <p:cNvPr id="3" name="Inhaltsplatzhalter 2">
+                <a:extLst>
+                  <a:ext uri="{FF2B5EF4-FFF2-40B4-BE49-F238E27FC236}">
+                    <a16:creationId xmlns:a16="http://schemas.microsoft.com/office/drawing/2014/main" id="{7DF119EF-E5CD-E6C3-DBEF-451E2BB0BEA6}"/>
+                  </a:ext>
+                </a:extLst>
+              </p:cNvPr>
+              <p:cNvSpPr>
+                <a:spLocks noGrp="1" noRot="1" noChangeAspect="1" noMove="1" noResize="1" noEditPoints="1" noAdjustHandles="1" noChangeArrowheads="1" noChangeShapeType="1" noTextEdit="1"/>
+              </p:cNvSpPr>
+              <p:nvPr>
+                <p:ph idx="1"/>
+              </p:nvPr>
+            </p:nvSpPr>
+            <p:spPr>
+              <a:blipFill>
+                <a:blip r:embed="rId2"/>
+                <a:stretch>
+                  <a:fillRect l="-965" t="-2035" b="-1744"/>
+                </a:stretch>
+              </a:blipFill>
+            </p:spPr>
+            <p:txBody>
+              <a:bodyPr/>
+              <a:lstStyle/>
+              <a:p>
+                <a:r>
+                  <a:rPr lang="de-DE">
+                    <a:noFill/>
+                  </a:rPr>
+                  <a:t> </a:t>
+                </a:r>
+              </a:p>
+            </p:txBody>
+          </p:sp>
+        </mc:Fallback>
+      </mc:AlternateContent>
+      <p:sp>
+        <p:nvSpPr>
+          <p:cNvPr id="4" name="Foliennummernplatzhalter 3">
+            <a:extLst>
+              <a:ext uri="{FF2B5EF4-FFF2-40B4-BE49-F238E27FC236}">
+                <a16:creationId xmlns:a16="http://schemas.microsoft.com/office/drawing/2014/main" id="{996B3FA0-89A5-6D59-0860-E7F83C416852}"/>
+              </a:ext>
+            </a:extLst>
+          </p:cNvPr>
+          <p:cNvSpPr>
+            <a:spLocks noGrp="1"/>
+          </p:cNvSpPr>
+          <p:nvPr>
+            <p:ph type="sldNum" sz="quarter" idx="12"/>
+          </p:nvPr>
+        </p:nvSpPr>
+        <p:spPr/>
+        <p:txBody>
+          <a:bodyPr/>
+          <a:lstStyle/>
+          <a:p>
+            <a:fld id="{08C366F5-AFAD-49CB-854A-9D9E238FCA13}" type="slidenum">
+              <a:rPr lang="en-GB" smtClean="0"/>
+              <a:t>19</a:t>
+            </a:fld>
+            <a:endParaRPr lang="en-GB"/>
+          </a:p>
+        </p:txBody>
+      </p:sp>
+    </p:spTree>
+    <p:extLst>
+      <p:ext uri="{BB962C8B-B14F-4D97-AF65-F5344CB8AC3E}">
+        <p14:creationId xmlns:p14="http://schemas.microsoft.com/office/powerpoint/2010/main" val="2031628033"/>
       </p:ext>
     </p:extLst>
   </p:cSld>
@@ -7620,6 +9922,1623 @@
     <p:extLst>
       <p:ext uri="{BB962C8B-B14F-4D97-AF65-F5344CB8AC3E}">
         <p14:creationId xmlns:p14="http://schemas.microsoft.com/office/powerpoint/2010/main" val="310336692"/>
+      </p:ext>
+    </p:extLst>
+  </p:cSld>
+  <p:clrMapOvr>
+    <a:masterClrMapping/>
+  </p:clrMapOvr>
+</p:sld>
+</file>
+
+<file path=ppt/slides/slide20.xml><?xml version="1.0" encoding="utf-8"?>
+<p:sld xmlns:a="http://schemas.openxmlformats.org/drawingml/2006/main" xmlns:r="http://schemas.openxmlformats.org/officeDocument/2006/relationships" xmlns:p="http://schemas.openxmlformats.org/presentationml/2006/main">
+  <p:cSld>
+    <p:spTree>
+      <p:nvGrpSpPr>
+        <p:cNvPr id="1" name=""/>
+        <p:cNvGrpSpPr/>
+        <p:nvPr/>
+      </p:nvGrpSpPr>
+      <p:grpSpPr>
+        <a:xfrm>
+          <a:off x="0" y="0"/>
+          <a:ext cx="0" cy="0"/>
+          <a:chOff x="0" y="0"/>
+          <a:chExt cx="0" cy="0"/>
+        </a:xfrm>
+      </p:grpSpPr>
+      <p:sp>
+        <p:nvSpPr>
+          <p:cNvPr id="2" name="Titel 1">
+            <a:extLst>
+              <a:ext uri="{FF2B5EF4-FFF2-40B4-BE49-F238E27FC236}">
+                <a16:creationId xmlns:a16="http://schemas.microsoft.com/office/drawing/2014/main" id="{E3D76B9D-A952-FA61-3FEA-B2C35BC9EBA5}"/>
+              </a:ext>
+            </a:extLst>
+          </p:cNvPr>
+          <p:cNvSpPr>
+            <a:spLocks noGrp="1"/>
+          </p:cNvSpPr>
+          <p:nvPr>
+            <p:ph type="title"/>
+          </p:nvPr>
+        </p:nvSpPr>
+        <p:spPr/>
+        <p:txBody>
+          <a:bodyPr/>
+          <a:lstStyle/>
+          <a:p>
+            <a:r>
+              <a:rPr lang="de-DE" dirty="0" err="1"/>
+              <a:t>Gain</a:t>
+            </a:r>
+            <a:r>
+              <a:rPr lang="de-DE" dirty="0"/>
+              <a:t> and Phase </a:t>
+            </a:r>
+            <a:r>
+              <a:rPr lang="de-DE" dirty="0" err="1"/>
+              <a:t>Margins</a:t>
+            </a:r>
+            <a:endParaRPr lang="de-DE" dirty="0"/>
+          </a:p>
+        </p:txBody>
+      </p:sp>
+      <mc:AlternateContent xmlns:mc="http://schemas.openxmlformats.org/markup-compatibility/2006">
+        <mc:Choice xmlns:a14="http://schemas.microsoft.com/office/drawing/2010/main" Requires="a14">
+          <p:sp>
+            <p:nvSpPr>
+              <p:cNvPr id="3" name="Inhaltsplatzhalter 2">
+                <a:extLst>
+                  <a:ext uri="{FF2B5EF4-FFF2-40B4-BE49-F238E27FC236}">
+                    <a16:creationId xmlns:a16="http://schemas.microsoft.com/office/drawing/2014/main" id="{841DCEC5-E062-73EC-599B-965A44B5F682}"/>
+                  </a:ext>
+                </a:extLst>
+              </p:cNvPr>
+              <p:cNvSpPr>
+                <a:spLocks noGrp="1"/>
+              </p:cNvSpPr>
+              <p:nvPr>
+                <p:ph idx="1"/>
+              </p:nvPr>
+            </p:nvSpPr>
+            <p:spPr/>
+            <p:txBody>
+              <a:bodyPr>
+                <a:normAutofit fontScale="85000" lnSpcReduction="20000"/>
+              </a:bodyPr>
+              <a:lstStyle/>
+              <a:p>
+                <a:pPr marL="0" indent="0">
+                  <a:buNone/>
+                </a:pPr>
+                <a:r>
+                  <a:rPr lang="de-DE" dirty="0"/>
+                  <a:t>Idea: </a:t>
+                </a:r>
+                <a:r>
+                  <a:rPr lang="de-DE" dirty="0" err="1"/>
+                  <a:t>measure</a:t>
+                </a:r>
+                <a:r>
+                  <a:rPr lang="de-DE" dirty="0"/>
+                  <a:t> </a:t>
+                </a:r>
+                <a:r>
+                  <a:rPr lang="de-DE" dirty="0" err="1"/>
+                  <a:t>distance</a:t>
+                </a:r>
+                <a:r>
+                  <a:rPr lang="de-DE" dirty="0"/>
+                  <a:t> </a:t>
+                </a:r>
+                <a:r>
+                  <a:rPr lang="de-DE" dirty="0" err="1"/>
+                  <a:t>to</a:t>
+                </a:r>
+                <a:r>
+                  <a:rPr lang="de-DE" dirty="0"/>
+                  <a:t> </a:t>
+                </a:r>
+                <a:r>
+                  <a:rPr lang="de-DE" dirty="0" err="1"/>
+                  <a:t>instability</a:t>
+                </a:r>
+                <a:r>
+                  <a:rPr lang="de-DE" dirty="0"/>
+                  <a:t> (</a:t>
+                </a:r>
+                <a:r>
+                  <a:rPr lang="de-DE" dirty="0" err="1"/>
+                  <a:t>of</a:t>
+                </a:r>
+                <a:r>
+                  <a:rPr lang="de-DE" dirty="0"/>
+                  <a:t> </a:t>
+                </a:r>
+                <a:r>
+                  <a:rPr lang="de-DE" dirty="0" err="1"/>
+                  <a:t>closed</a:t>
+                </a:r>
+                <a:r>
+                  <a:rPr lang="de-DE" dirty="0"/>
+                  <a:t>-loop </a:t>
+                </a:r>
+                <a:r>
+                  <a:rPr lang="de-DE" dirty="0" err="1"/>
+                  <a:t>system</a:t>
+                </a:r>
+                <a:r>
+                  <a:rPr lang="de-DE" dirty="0"/>
+                  <a:t>) </a:t>
+                </a:r>
+                <a:r>
+                  <a:rPr lang="de-DE" dirty="0" err="1"/>
+                  <a:t>from</a:t>
+                </a:r>
+                <a:r>
+                  <a:rPr lang="de-DE" dirty="0"/>
+                  <a:t> Bode </a:t>
+                </a:r>
+                <a:r>
+                  <a:rPr lang="de-DE" dirty="0" err="1"/>
+                  <a:t>plots</a:t>
+                </a:r>
+                <a:endParaRPr lang="de-DE" dirty="0"/>
+              </a:p>
+              <a:p>
+                <a:pPr marL="0" indent="0">
+                  <a:buNone/>
+                </a:pPr>
+                <a:r>
+                  <a:rPr lang="de-DE" dirty="0">
+                    <a:sym typeface="Wingdings" pitchFamily="2" charset="2"/>
+                  </a:rPr>
+                  <a:t> </a:t>
+                </a:r>
+                <a:r>
+                  <a:rPr lang="de-DE" dirty="0" err="1">
+                    <a:sym typeface="Wingdings" pitchFamily="2" charset="2"/>
+                  </a:rPr>
+                  <a:t>p</a:t>
+                </a:r>
+                <a:r>
+                  <a:rPr lang="de-DE" dirty="0" err="1"/>
+                  <a:t>ractical</a:t>
+                </a:r>
+                <a:r>
+                  <a:rPr lang="de-DE" dirty="0"/>
+                  <a:t> </a:t>
+                </a:r>
+                <a:r>
+                  <a:rPr lang="de-DE" dirty="0" err="1"/>
+                  <a:t>robustness</a:t>
+                </a:r>
+                <a:r>
+                  <a:rPr lang="de-DE" dirty="0"/>
+                  <a:t> </a:t>
+                </a:r>
+                <a:r>
+                  <a:rPr lang="de-DE" dirty="0" err="1"/>
+                  <a:t>indicators</a:t>
+                </a:r>
+                <a:endParaRPr lang="de-DE" dirty="0"/>
+              </a:p>
+              <a:p>
+                <a:pPr marL="0" indent="0">
+                  <a:buNone/>
+                </a:pPr>
+                <a:endParaRPr lang="de-DE" dirty="0"/>
+              </a:p>
+              <a:p>
+                <a:pPr marL="0" indent="0">
+                  <a:buNone/>
+                </a:pPr>
+                <a:r>
+                  <a:rPr lang="de-DE" dirty="0" err="1"/>
+                  <a:t>Instability</a:t>
+                </a:r>
+                <a:r>
+                  <a:rPr lang="de-DE" dirty="0"/>
+                  <a:t>: </a:t>
+                </a:r>
+                <a14:m>
+                  <m:oMath xmlns:m="http://schemas.openxmlformats.org/officeDocument/2006/math">
+                    <m:r>
+                      <a:rPr lang="de-DE" i="1">
+                        <a:latin typeface="Cambria Math" panose="02040503050406030204" pitchFamily="18" charset="0"/>
+                        <a:ea typeface="Cambria Math" panose="02040503050406030204" pitchFamily="18" charset="0"/>
+                      </a:rPr>
+                      <m:t>𝐿</m:t>
+                    </m:r>
+                    <m:d>
+                      <m:dPr>
+                        <m:ctrlPr>
+                          <a:rPr lang="de-DE" i="1">
+                            <a:latin typeface="Cambria Math" panose="02040503050406030204" pitchFamily="18" charset="0"/>
+                          </a:rPr>
+                        </m:ctrlPr>
+                      </m:dPr>
+                      <m:e>
+                        <m:r>
+                          <a:rPr lang="de-DE" i="1">
+                            <a:latin typeface="Cambria Math" panose="02040503050406030204" pitchFamily="18" charset="0"/>
+                          </a:rPr>
+                          <m:t>𝑗</m:t>
+                        </m:r>
+                        <m:r>
+                          <a:rPr lang="de-DE" i="1">
+                            <a:latin typeface="Cambria Math" panose="02040503050406030204" pitchFamily="18" charset="0"/>
+                            <a:ea typeface="Cambria Math" panose="02040503050406030204" pitchFamily="18" charset="0"/>
+                          </a:rPr>
+                          <m:t>𝜔</m:t>
+                        </m:r>
+                      </m:e>
+                    </m:d>
+                    <m:r>
+                      <a:rPr lang="de-DE" b="0" i="1" smtClean="0">
+                        <a:latin typeface="Cambria Math" panose="02040503050406030204" pitchFamily="18" charset="0"/>
+                        <a:ea typeface="Cambria Math" panose="02040503050406030204" pitchFamily="18" charset="0"/>
+                      </a:rPr>
+                      <m:t>=−1</m:t>
+                    </m:r>
+                  </m:oMath>
+                </a14:m>
+                <a:endParaRPr lang="de-DE" dirty="0"/>
+              </a:p>
+              <a:p>
+                <a:pPr marL="0" indent="0">
+                  <a:buNone/>
+                </a:pPr>
+                <a:r>
+                  <a:rPr lang="de-DE" dirty="0"/>
+                  <a:t>In polar form: </a:t>
+                </a:r>
+                <a14:m>
+                  <m:oMath xmlns:m="http://schemas.openxmlformats.org/officeDocument/2006/math">
+                    <m:d>
+                      <m:dPr>
+                        <m:begChr m:val="|"/>
+                        <m:endChr m:val="|"/>
+                        <m:ctrlPr>
+                          <a:rPr lang="de-DE" i="1" smtClean="0">
+                            <a:latin typeface="Cambria Math" panose="02040503050406030204" pitchFamily="18" charset="0"/>
+                            <a:ea typeface="Cambria Math" panose="02040503050406030204" pitchFamily="18" charset="0"/>
+                          </a:rPr>
+                        </m:ctrlPr>
+                      </m:dPr>
+                      <m:e>
+                        <m:r>
+                          <a:rPr lang="de-DE" i="1">
+                            <a:latin typeface="Cambria Math" panose="02040503050406030204" pitchFamily="18" charset="0"/>
+                            <a:ea typeface="Cambria Math" panose="02040503050406030204" pitchFamily="18" charset="0"/>
+                          </a:rPr>
+                          <m:t>𝐿</m:t>
+                        </m:r>
+                        <m:d>
+                          <m:dPr>
+                            <m:ctrlPr>
+                              <a:rPr lang="de-DE" i="1">
+                                <a:latin typeface="Cambria Math" panose="02040503050406030204" pitchFamily="18" charset="0"/>
+                              </a:rPr>
+                            </m:ctrlPr>
+                          </m:dPr>
+                          <m:e>
+                            <m:r>
+                              <a:rPr lang="de-DE" i="1">
+                                <a:latin typeface="Cambria Math" panose="02040503050406030204" pitchFamily="18" charset="0"/>
+                              </a:rPr>
+                              <m:t>𝑗</m:t>
+                            </m:r>
+                            <m:r>
+                              <a:rPr lang="de-DE" i="1">
+                                <a:latin typeface="Cambria Math" panose="02040503050406030204" pitchFamily="18" charset="0"/>
+                                <a:ea typeface="Cambria Math" panose="02040503050406030204" pitchFamily="18" charset="0"/>
+                              </a:rPr>
+                              <m:t>𝜔</m:t>
+                            </m:r>
+                          </m:e>
+                        </m:d>
+                      </m:e>
+                    </m:d>
+                    <m:r>
+                      <a:rPr lang="de-DE" b="0" i="1" smtClean="0">
+                        <a:latin typeface="Cambria Math" panose="02040503050406030204" pitchFamily="18" charset="0"/>
+                        <a:ea typeface="Cambria Math" panose="02040503050406030204" pitchFamily="18" charset="0"/>
+                      </a:rPr>
+                      <m:t>=1,     ∠</m:t>
+                    </m:r>
+                    <m:r>
+                      <a:rPr lang="de-DE" i="1">
+                        <a:latin typeface="Cambria Math" panose="02040503050406030204" pitchFamily="18" charset="0"/>
+                        <a:ea typeface="Cambria Math" panose="02040503050406030204" pitchFamily="18" charset="0"/>
+                      </a:rPr>
+                      <m:t>𝐿</m:t>
+                    </m:r>
+                    <m:d>
+                      <m:dPr>
+                        <m:ctrlPr>
+                          <a:rPr lang="de-DE" i="1">
+                            <a:latin typeface="Cambria Math" panose="02040503050406030204" pitchFamily="18" charset="0"/>
+                          </a:rPr>
+                        </m:ctrlPr>
+                      </m:dPr>
+                      <m:e>
+                        <m:r>
+                          <a:rPr lang="de-DE" i="1">
+                            <a:latin typeface="Cambria Math" panose="02040503050406030204" pitchFamily="18" charset="0"/>
+                          </a:rPr>
+                          <m:t>𝑗</m:t>
+                        </m:r>
+                        <m:r>
+                          <a:rPr lang="de-DE" i="1">
+                            <a:latin typeface="Cambria Math" panose="02040503050406030204" pitchFamily="18" charset="0"/>
+                            <a:ea typeface="Cambria Math" panose="02040503050406030204" pitchFamily="18" charset="0"/>
+                          </a:rPr>
+                          <m:t>𝜔</m:t>
+                        </m:r>
+                      </m:e>
+                    </m:d>
+                    <m:r>
+                      <a:rPr lang="de-DE" b="0" i="1" smtClean="0">
+                        <a:latin typeface="Cambria Math" panose="02040503050406030204" pitchFamily="18" charset="0"/>
+                        <a:ea typeface="Cambria Math" panose="02040503050406030204" pitchFamily="18" charset="0"/>
+                      </a:rPr>
+                      <m:t>=−180°</m:t>
+                    </m:r>
+                  </m:oMath>
+                </a14:m>
+                <a:endParaRPr lang="de-DE" dirty="0"/>
+              </a:p>
+              <a:p>
+                <a:r>
+                  <a:rPr lang="de-DE" dirty="0" err="1"/>
+                  <a:t>If</a:t>
+                </a:r>
+                <a:r>
+                  <a:rPr lang="de-DE" dirty="0"/>
+                  <a:t> </a:t>
+                </a:r>
+                <a:r>
+                  <a:rPr lang="de-DE" dirty="0" err="1"/>
+                  <a:t>magnitude</a:t>
+                </a:r>
+                <a:r>
+                  <a:rPr lang="de-DE" dirty="0"/>
+                  <a:t> </a:t>
+                </a:r>
+                <a:r>
+                  <a:rPr lang="de-DE" dirty="0" err="1"/>
+                  <a:t>is</a:t>
+                </a:r>
+                <a:r>
+                  <a:rPr lang="de-DE" dirty="0"/>
+                  <a:t> </a:t>
+                </a:r>
+                <a:r>
+                  <a:rPr lang="de-DE" dirty="0" err="1"/>
+                  <a:t>less</a:t>
+                </a:r>
+                <a:r>
+                  <a:rPr lang="de-DE" dirty="0"/>
+                  <a:t> </a:t>
+                </a:r>
+                <a:r>
+                  <a:rPr lang="de-DE" dirty="0" err="1"/>
+                  <a:t>than</a:t>
+                </a:r>
+                <a:r>
+                  <a:rPr lang="de-DE" dirty="0"/>
+                  <a:t> </a:t>
+                </a:r>
+                <a14:m>
+                  <m:oMath xmlns:m="http://schemas.openxmlformats.org/officeDocument/2006/math">
+                    <m:r>
+                      <a:rPr lang="de-DE" i="1">
+                        <a:latin typeface="Cambria Math" panose="02040503050406030204" pitchFamily="18" charset="0"/>
+                        <a:ea typeface="Cambria Math" panose="02040503050406030204" pitchFamily="18" charset="0"/>
+                      </a:rPr>
+                      <m:t>1</m:t>
+                    </m:r>
+                  </m:oMath>
+                </a14:m>
+                <a:r>
+                  <a:rPr lang="de-DE" dirty="0"/>
+                  <a:t> at </a:t>
+                </a:r>
+                <a:r>
+                  <a:rPr lang="de-DE" dirty="0" err="1"/>
+                  <a:t>phase</a:t>
+                </a:r>
+                <a:r>
+                  <a:rPr lang="de-DE" dirty="0"/>
+                  <a:t> </a:t>
+                </a:r>
+                <a14:m>
+                  <m:oMath xmlns:m="http://schemas.openxmlformats.org/officeDocument/2006/math">
+                    <m:r>
+                      <a:rPr lang="de-DE" i="1">
+                        <a:latin typeface="Cambria Math" panose="02040503050406030204" pitchFamily="18" charset="0"/>
+                        <a:ea typeface="Cambria Math" panose="02040503050406030204" pitchFamily="18" charset="0"/>
+                      </a:rPr>
+                      <m:t>−180°</m:t>
+                    </m:r>
+                  </m:oMath>
+                </a14:m>
+                <a:r>
+                  <a:rPr lang="de-DE" dirty="0">
+                    <a:sym typeface="Wingdings" pitchFamily="2" charset="2"/>
+                  </a:rPr>
+                  <a:t>  </a:t>
+                </a:r>
+                <a:r>
+                  <a:rPr lang="de-DE" dirty="0" err="1"/>
+                  <a:t>stable</a:t>
+                </a:r>
+                <a:endParaRPr lang="de-DE" dirty="0"/>
+              </a:p>
+              <a:p>
+                <a:r>
+                  <a:rPr lang="de-DE" dirty="0" err="1"/>
+                  <a:t>If</a:t>
+                </a:r>
+                <a:r>
+                  <a:rPr lang="de-DE" dirty="0"/>
+                  <a:t> </a:t>
+                </a:r>
+                <a:r>
+                  <a:rPr lang="de-DE" dirty="0" err="1"/>
+                  <a:t>magnitude</a:t>
+                </a:r>
+                <a:r>
+                  <a:rPr lang="de-DE" dirty="0"/>
+                  <a:t> </a:t>
+                </a:r>
+                <a:r>
+                  <a:rPr lang="de-DE" dirty="0" err="1"/>
+                  <a:t>is</a:t>
+                </a:r>
+                <a:r>
+                  <a:rPr lang="de-DE" dirty="0"/>
+                  <a:t> </a:t>
+                </a:r>
+                <a:r>
+                  <a:rPr lang="de-DE" dirty="0" err="1"/>
+                  <a:t>greater</a:t>
+                </a:r>
+                <a:r>
+                  <a:rPr lang="de-DE" dirty="0"/>
+                  <a:t> </a:t>
+                </a:r>
+                <a:r>
+                  <a:rPr lang="de-DE" dirty="0" err="1"/>
+                  <a:t>than</a:t>
+                </a:r>
+                <a:r>
+                  <a:rPr lang="de-DE" dirty="0"/>
+                  <a:t> </a:t>
+                </a:r>
+                <a14:m>
+                  <m:oMath xmlns:m="http://schemas.openxmlformats.org/officeDocument/2006/math">
+                    <m:r>
+                      <a:rPr lang="de-DE" i="1">
+                        <a:latin typeface="Cambria Math" panose="02040503050406030204" pitchFamily="18" charset="0"/>
+                        <a:ea typeface="Cambria Math" panose="02040503050406030204" pitchFamily="18" charset="0"/>
+                      </a:rPr>
+                      <m:t>1</m:t>
+                    </m:r>
+                  </m:oMath>
+                </a14:m>
+                <a:r>
+                  <a:rPr lang="de-DE" dirty="0"/>
+                  <a:t> at </a:t>
+                </a:r>
+                <a:r>
+                  <a:rPr lang="de-DE" dirty="0" err="1"/>
+                  <a:t>phase</a:t>
+                </a:r>
+                <a:r>
+                  <a:rPr lang="de-DE" dirty="0"/>
+                  <a:t> </a:t>
+                </a:r>
+                <a14:m>
+                  <m:oMath xmlns:m="http://schemas.openxmlformats.org/officeDocument/2006/math">
+                    <m:r>
+                      <a:rPr lang="de-DE" i="1">
+                        <a:latin typeface="Cambria Math" panose="02040503050406030204" pitchFamily="18" charset="0"/>
+                        <a:ea typeface="Cambria Math" panose="02040503050406030204" pitchFamily="18" charset="0"/>
+                      </a:rPr>
+                      <m:t>−180°</m:t>
+                    </m:r>
+                  </m:oMath>
+                </a14:m>
+                <a:r>
+                  <a:rPr lang="de-DE" dirty="0"/>
+                  <a:t> </a:t>
+                </a:r>
+                <a:r>
+                  <a:rPr lang="de-DE" dirty="0">
+                    <a:sym typeface="Wingdings" pitchFamily="2" charset="2"/>
+                  </a:rPr>
+                  <a:t> </a:t>
+                </a:r>
+                <a:r>
+                  <a:rPr lang="de-DE" dirty="0" err="1"/>
+                  <a:t>unstable</a:t>
+                </a:r>
+                <a:endParaRPr lang="de-DE" dirty="0"/>
+              </a:p>
+              <a:p>
+                <a:pPr marL="0" indent="0">
+                  <a:buNone/>
+                </a:pPr>
+                <a:endParaRPr lang="de-DE" dirty="0"/>
+              </a:p>
+              <a:p>
+                <a:pPr marL="0" indent="0">
+                  <a:buNone/>
+                </a:pPr>
+                <a:r>
+                  <a:rPr lang="de-DE" dirty="0" err="1"/>
+                  <a:t>Margins</a:t>
+                </a:r>
+                <a:r>
+                  <a:rPr lang="de-DE" dirty="0"/>
+                  <a:t> </a:t>
+                </a:r>
+                <a:r>
+                  <a:rPr lang="de-DE" dirty="0" err="1"/>
+                  <a:t>measure</a:t>
+                </a:r>
+                <a:r>
+                  <a:rPr lang="de-DE" dirty="0"/>
+                  <a:t> </a:t>
+                </a:r>
+                <a:r>
+                  <a:rPr lang="de-DE" dirty="0" err="1"/>
+                  <a:t>distance</a:t>
+                </a:r>
+                <a:r>
+                  <a:rPr lang="de-DE" dirty="0"/>
+                  <a:t> </a:t>
+                </a:r>
+                <a:r>
+                  <a:rPr lang="de-DE" dirty="0" err="1"/>
+                  <a:t>from</a:t>
+                </a:r>
+                <a:r>
+                  <a:rPr lang="de-DE" dirty="0"/>
+                  <a:t> </a:t>
+                </a:r>
+                <a:r>
+                  <a:rPr lang="de-DE" dirty="0" err="1"/>
+                  <a:t>that</a:t>
+                </a:r>
+                <a:r>
+                  <a:rPr lang="de-DE" dirty="0"/>
+                  <a:t> </a:t>
+                </a:r>
+                <a:r>
+                  <a:rPr lang="de-DE" dirty="0" err="1"/>
+                  <a:t>dangerous</a:t>
+                </a:r>
+                <a:r>
+                  <a:rPr lang="de-DE" dirty="0"/>
+                  <a:t> </a:t>
+                </a:r>
+                <a:r>
+                  <a:rPr lang="de-DE" dirty="0" err="1"/>
+                  <a:t>condition</a:t>
+                </a:r>
+                <a:endParaRPr lang="de-DE" dirty="0"/>
+              </a:p>
+              <a:p>
+                <a:r>
+                  <a:rPr lang="de-DE" dirty="0" err="1"/>
+                  <a:t>Gain</a:t>
+                </a:r>
+                <a:r>
+                  <a:rPr lang="de-DE" dirty="0"/>
+                  <a:t> </a:t>
+                </a:r>
+                <a:r>
+                  <a:rPr lang="de-DE" dirty="0" err="1"/>
+                  <a:t>margin</a:t>
+                </a:r>
+                <a:r>
+                  <a:rPr lang="de-DE" dirty="0"/>
+                  <a:t>: </a:t>
+                </a:r>
+                <a:r>
+                  <a:rPr lang="de-DE" dirty="0" err="1"/>
+                  <a:t>how</a:t>
+                </a:r>
+                <a:r>
+                  <a:rPr lang="de-DE" dirty="0"/>
+                  <a:t> </a:t>
+                </a:r>
+                <a:r>
+                  <a:rPr lang="de-DE" dirty="0" err="1"/>
+                  <a:t>much</a:t>
+                </a:r>
+                <a:r>
+                  <a:rPr lang="de-DE" dirty="0"/>
+                  <a:t> </a:t>
+                </a:r>
+                <a:r>
+                  <a:rPr lang="de-DE" dirty="0" err="1"/>
+                  <a:t>the</a:t>
+                </a:r>
+                <a:r>
+                  <a:rPr lang="de-DE" dirty="0"/>
+                  <a:t> loop </a:t>
+                </a:r>
+                <a:r>
+                  <a:rPr lang="de-DE" dirty="0" err="1"/>
+                  <a:t>gain</a:t>
+                </a:r>
+                <a:r>
+                  <a:rPr lang="de-DE" dirty="0"/>
+                  <a:t> </a:t>
+                </a:r>
+                <a:r>
+                  <a:rPr lang="de-DE" dirty="0" err="1"/>
+                  <a:t>can</a:t>
+                </a:r>
+                <a:r>
+                  <a:rPr lang="de-DE" dirty="0"/>
+                  <a:t> </a:t>
+                </a:r>
+                <a:r>
+                  <a:rPr lang="de-DE" dirty="0" err="1"/>
+                  <a:t>be</a:t>
+                </a:r>
+                <a:r>
+                  <a:rPr lang="de-DE" dirty="0"/>
+                  <a:t> </a:t>
+                </a:r>
+                <a:r>
+                  <a:rPr lang="de-DE" dirty="0" err="1"/>
+                  <a:t>increased</a:t>
+                </a:r>
+                <a:r>
+                  <a:rPr lang="de-DE" dirty="0"/>
+                  <a:t> </a:t>
+                </a:r>
+                <a:r>
+                  <a:rPr lang="de-DE" dirty="0" err="1"/>
+                  <a:t>before</a:t>
+                </a:r>
+                <a:r>
+                  <a:rPr lang="de-DE" dirty="0"/>
+                  <a:t> </a:t>
+                </a:r>
+                <a:r>
+                  <a:rPr lang="de-DE" dirty="0" err="1"/>
+                  <a:t>instability</a:t>
+                </a:r>
+                <a:endParaRPr lang="de-DE" dirty="0"/>
+              </a:p>
+              <a:p>
+                <a:r>
+                  <a:rPr lang="de-DE" dirty="0"/>
+                  <a:t>Phase </a:t>
+                </a:r>
+                <a:r>
+                  <a:rPr lang="de-DE" dirty="0" err="1"/>
+                  <a:t>margin</a:t>
+                </a:r>
+                <a:r>
+                  <a:rPr lang="de-DE" dirty="0"/>
+                  <a:t>: </a:t>
+                </a:r>
+                <a:r>
+                  <a:rPr lang="de-DE" dirty="0" err="1"/>
+                  <a:t>how</a:t>
+                </a:r>
+                <a:r>
+                  <a:rPr lang="de-DE" dirty="0"/>
+                  <a:t> </a:t>
+                </a:r>
+                <a:r>
+                  <a:rPr lang="de-DE" dirty="0" err="1"/>
+                  <a:t>much</a:t>
+                </a:r>
+                <a:r>
+                  <a:rPr lang="de-DE" dirty="0"/>
+                  <a:t> </a:t>
+                </a:r>
+                <a:r>
+                  <a:rPr lang="de-DE" dirty="0" err="1"/>
+                  <a:t>more</a:t>
+                </a:r>
+                <a:r>
+                  <a:rPr lang="de-DE" dirty="0"/>
+                  <a:t> </a:t>
+                </a:r>
+                <a:r>
+                  <a:rPr lang="de-DE" dirty="0" err="1"/>
+                  <a:t>phase</a:t>
+                </a:r>
+                <a:r>
+                  <a:rPr lang="de-DE" dirty="0"/>
+                  <a:t> lag </a:t>
+                </a:r>
+                <a:r>
+                  <a:rPr lang="de-DE" dirty="0" err="1"/>
+                  <a:t>can</a:t>
+                </a:r>
+                <a:r>
+                  <a:rPr lang="de-DE" dirty="0"/>
+                  <a:t> </a:t>
+                </a:r>
+                <a:r>
+                  <a:rPr lang="de-DE" dirty="0" err="1"/>
+                  <a:t>be</a:t>
+                </a:r>
+                <a:r>
+                  <a:rPr lang="de-DE" dirty="0"/>
+                  <a:t> </a:t>
+                </a:r>
+                <a:r>
+                  <a:rPr lang="de-DE" dirty="0" err="1"/>
+                  <a:t>tolerated</a:t>
+                </a:r>
+                <a:r>
+                  <a:rPr lang="de-DE" dirty="0"/>
+                  <a:t> </a:t>
+                </a:r>
+                <a:r>
+                  <a:rPr lang="de-DE" dirty="0" err="1"/>
+                  <a:t>before</a:t>
+                </a:r>
+                <a:r>
+                  <a:rPr lang="de-DE" dirty="0"/>
+                  <a:t> </a:t>
+                </a:r>
+                <a:r>
+                  <a:rPr lang="de-DE" dirty="0" err="1"/>
+                  <a:t>instability</a:t>
+                </a:r>
+                <a:endParaRPr lang="de-DE" dirty="0"/>
+              </a:p>
+            </p:txBody>
+          </p:sp>
+        </mc:Choice>
+        <mc:Fallback>
+          <p:sp>
+            <p:nvSpPr>
+              <p:cNvPr id="3" name="Inhaltsplatzhalter 2">
+                <a:extLst>
+                  <a:ext uri="{FF2B5EF4-FFF2-40B4-BE49-F238E27FC236}">
+                    <a16:creationId xmlns:a16="http://schemas.microsoft.com/office/drawing/2014/main" id="{841DCEC5-E062-73EC-599B-965A44B5F682}"/>
+                  </a:ext>
+                </a:extLst>
+              </p:cNvPr>
+              <p:cNvSpPr>
+                <a:spLocks noGrp="1" noRot="1" noChangeAspect="1" noMove="1" noResize="1" noEditPoints="1" noAdjustHandles="1" noChangeArrowheads="1" noChangeShapeType="1" noTextEdit="1"/>
+              </p:cNvSpPr>
+              <p:nvPr>
+                <p:ph idx="1"/>
+              </p:nvPr>
+            </p:nvSpPr>
+            <p:spPr>
+              <a:blipFill>
+                <a:blip r:embed="rId2"/>
+                <a:stretch>
+                  <a:fillRect l="-965" t="-3198"/>
+                </a:stretch>
+              </a:blipFill>
+            </p:spPr>
+            <p:txBody>
+              <a:bodyPr/>
+              <a:lstStyle/>
+              <a:p>
+                <a:r>
+                  <a:rPr lang="de-DE">
+                    <a:noFill/>
+                  </a:rPr>
+                  <a:t> </a:t>
+                </a:r>
+              </a:p>
+            </p:txBody>
+          </p:sp>
+        </mc:Fallback>
+      </mc:AlternateContent>
+      <p:sp>
+        <p:nvSpPr>
+          <p:cNvPr id="4" name="Foliennummernplatzhalter 3">
+            <a:extLst>
+              <a:ext uri="{FF2B5EF4-FFF2-40B4-BE49-F238E27FC236}">
+                <a16:creationId xmlns:a16="http://schemas.microsoft.com/office/drawing/2014/main" id="{B0C0EBA0-2646-D649-137B-265D744CEEEB}"/>
+              </a:ext>
+            </a:extLst>
+          </p:cNvPr>
+          <p:cNvSpPr>
+            <a:spLocks noGrp="1"/>
+          </p:cNvSpPr>
+          <p:nvPr>
+            <p:ph type="sldNum" sz="quarter" idx="12"/>
+          </p:nvPr>
+        </p:nvSpPr>
+        <p:spPr/>
+        <p:txBody>
+          <a:bodyPr/>
+          <a:lstStyle/>
+          <a:p>
+            <a:fld id="{08C366F5-AFAD-49CB-854A-9D9E238FCA13}" type="slidenum">
+              <a:rPr lang="en-GB" smtClean="0"/>
+              <a:t>20</a:t>
+            </a:fld>
+            <a:endParaRPr lang="en-GB"/>
+          </a:p>
+        </p:txBody>
+      </p:sp>
+    </p:spTree>
+    <p:extLst>
+      <p:ext uri="{BB962C8B-B14F-4D97-AF65-F5344CB8AC3E}">
+        <p14:creationId xmlns:p14="http://schemas.microsoft.com/office/powerpoint/2010/main" val="4254092505"/>
+      </p:ext>
+    </p:extLst>
+  </p:cSld>
+  <p:clrMapOvr>
+    <a:masterClrMapping/>
+  </p:clrMapOvr>
+</p:sld>
+</file>
+
+<file path=ppt/slides/slide21.xml><?xml version="1.0" encoding="utf-8"?>
+<p:sld xmlns:a="http://schemas.openxmlformats.org/drawingml/2006/main" xmlns:r="http://schemas.openxmlformats.org/officeDocument/2006/relationships" xmlns:p="http://schemas.openxmlformats.org/presentationml/2006/main">
+  <p:cSld>
+    <p:spTree>
+      <p:nvGrpSpPr>
+        <p:cNvPr id="1" name=""/>
+        <p:cNvGrpSpPr/>
+        <p:nvPr/>
+      </p:nvGrpSpPr>
+      <p:grpSpPr>
+        <a:xfrm>
+          <a:off x="0" y="0"/>
+          <a:ext cx="0" cy="0"/>
+          <a:chOff x="0" y="0"/>
+          <a:chExt cx="0" cy="0"/>
+        </a:xfrm>
+      </p:grpSpPr>
+      <p:sp>
+        <p:nvSpPr>
+          <p:cNvPr id="2" name="Titel 1">
+            <a:extLst>
+              <a:ext uri="{FF2B5EF4-FFF2-40B4-BE49-F238E27FC236}">
+                <a16:creationId xmlns:a16="http://schemas.microsoft.com/office/drawing/2014/main" id="{F5F2C1E1-478C-0BD9-8D82-4876E52562BC}"/>
+              </a:ext>
+            </a:extLst>
+          </p:cNvPr>
+          <p:cNvSpPr>
+            <a:spLocks noGrp="1"/>
+          </p:cNvSpPr>
+          <p:nvPr>
+            <p:ph type="title"/>
+          </p:nvPr>
+        </p:nvSpPr>
+        <p:spPr/>
+        <p:txBody>
+          <a:bodyPr/>
+          <a:lstStyle/>
+          <a:p>
+            <a:r>
+              <a:rPr lang="de-DE" dirty="0"/>
+              <a:t>Crossover </a:t>
+            </a:r>
+            <a:r>
+              <a:rPr lang="de-DE" dirty="0" err="1"/>
+              <a:t>Frequencies</a:t>
+            </a:r>
+            <a:endParaRPr lang="de-DE" dirty="0"/>
+          </a:p>
+        </p:txBody>
+      </p:sp>
+      <mc:AlternateContent xmlns:mc="http://schemas.openxmlformats.org/markup-compatibility/2006">
+        <mc:Choice xmlns:a14="http://schemas.microsoft.com/office/drawing/2010/main" Requires="a14">
+          <p:sp>
+            <p:nvSpPr>
+              <p:cNvPr id="3" name="Inhaltsplatzhalter 2">
+                <a:extLst>
+                  <a:ext uri="{FF2B5EF4-FFF2-40B4-BE49-F238E27FC236}">
+                    <a16:creationId xmlns:a16="http://schemas.microsoft.com/office/drawing/2014/main" id="{07BA2F6C-A63D-4870-28C6-4BE78A35D9B6}"/>
+                  </a:ext>
+                </a:extLst>
+              </p:cNvPr>
+              <p:cNvSpPr>
+                <a:spLocks noGrp="1"/>
+              </p:cNvSpPr>
+              <p:nvPr>
+                <p:ph idx="1"/>
+              </p:nvPr>
+            </p:nvSpPr>
+            <p:spPr/>
+            <p:txBody>
+              <a:bodyPr>
+                <a:normAutofit fontScale="92500" lnSpcReduction="10000"/>
+              </a:bodyPr>
+              <a:lstStyle/>
+              <a:p>
+                <a:pPr marL="0" indent="0">
+                  <a:buNone/>
+                </a:pPr>
+                <a:r>
+                  <a:rPr lang="de-DE" dirty="0"/>
+                  <a:t>Phase </a:t>
+                </a:r>
+                <a:r>
+                  <a:rPr lang="de-DE" dirty="0" err="1"/>
+                  <a:t>crossover</a:t>
+                </a:r>
+                <a:r>
+                  <a:rPr lang="de-DE" dirty="0"/>
+                  <a:t> </a:t>
+                </a:r>
+                <a:r>
+                  <a:rPr lang="de-DE" dirty="0" err="1"/>
+                  <a:t>frequency</a:t>
+                </a:r>
+                <a:r>
+                  <a:rPr lang="de-DE" dirty="0"/>
+                  <a:t>:</a:t>
+                </a:r>
+                <a:endParaRPr lang="de-DE" dirty="0">
+                  <a:ea typeface="Cambria Math" panose="02040503050406030204" pitchFamily="18" charset="0"/>
+                </a:endParaRPr>
+              </a:p>
+              <a:p>
+                <a:pPr marL="0" indent="0">
+                  <a:buNone/>
+                </a:pPr>
+                <a:r>
+                  <a:rPr lang="de-DE" dirty="0">
+                    <a:ea typeface="Cambria Math" panose="02040503050406030204" pitchFamily="18" charset="0"/>
+                  </a:rPr>
+                  <a:t>	</a:t>
+                </a:r>
+                <a14:m>
+                  <m:oMath xmlns:m="http://schemas.openxmlformats.org/officeDocument/2006/math">
+                    <m:r>
+                      <a:rPr lang="de-DE" i="1">
+                        <a:latin typeface="Cambria Math" panose="02040503050406030204" pitchFamily="18" charset="0"/>
+                        <a:ea typeface="Cambria Math" panose="02040503050406030204" pitchFamily="18" charset="0"/>
+                      </a:rPr>
+                      <m:t>∠</m:t>
+                    </m:r>
+                    <m:r>
+                      <a:rPr lang="de-DE" i="1">
+                        <a:latin typeface="Cambria Math" panose="02040503050406030204" pitchFamily="18" charset="0"/>
+                        <a:ea typeface="Cambria Math" panose="02040503050406030204" pitchFamily="18" charset="0"/>
+                      </a:rPr>
+                      <m:t>𝐿</m:t>
+                    </m:r>
+                    <m:d>
+                      <m:dPr>
+                        <m:ctrlPr>
+                          <a:rPr lang="de-DE" i="1">
+                            <a:latin typeface="Cambria Math" panose="02040503050406030204" pitchFamily="18" charset="0"/>
+                          </a:rPr>
+                        </m:ctrlPr>
+                      </m:dPr>
+                      <m:e>
+                        <m:r>
+                          <a:rPr lang="de-DE" i="1">
+                            <a:latin typeface="Cambria Math" panose="02040503050406030204" pitchFamily="18" charset="0"/>
+                          </a:rPr>
+                          <m:t>𝑗</m:t>
+                        </m:r>
+                        <m:sSub>
+                          <m:sSubPr>
+                            <m:ctrlPr>
+                              <a:rPr lang="de-DE" i="1">
+                                <a:latin typeface="Cambria Math" panose="02040503050406030204" pitchFamily="18" charset="0"/>
+                                <a:ea typeface="Cambria Math" panose="02040503050406030204" pitchFamily="18" charset="0"/>
+                              </a:rPr>
+                            </m:ctrlPr>
+                          </m:sSubPr>
+                          <m:e>
+                            <m:r>
+                              <a:rPr lang="de-DE" i="1">
+                                <a:latin typeface="Cambria Math" panose="02040503050406030204" pitchFamily="18" charset="0"/>
+                                <a:ea typeface="Cambria Math" panose="02040503050406030204" pitchFamily="18" charset="0"/>
+                              </a:rPr>
+                              <m:t>𝜔</m:t>
+                            </m:r>
+                          </m:e>
+                          <m:sub>
+                            <m:r>
+                              <a:rPr lang="de-DE" i="1">
+                                <a:latin typeface="Cambria Math" panose="02040503050406030204" pitchFamily="18" charset="0"/>
+                                <a:ea typeface="Cambria Math" panose="02040503050406030204" pitchFamily="18" charset="0"/>
+                              </a:rPr>
+                              <m:t>𝑝</m:t>
+                            </m:r>
+                            <m:r>
+                              <a:rPr lang="de-DE" i="1">
+                                <a:latin typeface="Cambria Math" panose="02040503050406030204" pitchFamily="18" charset="0"/>
+                                <a:ea typeface="Cambria Math" panose="02040503050406030204" pitchFamily="18" charset="0"/>
+                              </a:rPr>
+                              <m:t>𝑐</m:t>
+                            </m:r>
+                          </m:sub>
+                        </m:sSub>
+                      </m:e>
+                    </m:d>
+                    <m:r>
+                      <a:rPr lang="de-DE">
+                        <a:latin typeface="Cambria Math" panose="02040503050406030204" pitchFamily="18" charset="0"/>
+                        <a:ea typeface="Cambria Math" panose="02040503050406030204" pitchFamily="18" charset="0"/>
+                      </a:rPr>
+                      <m:t>=</m:t>
+                    </m:r>
+                    <m:r>
+                      <a:rPr lang="de-DE" i="1">
+                        <a:latin typeface="Cambria Math" panose="02040503050406030204" pitchFamily="18" charset="0"/>
+                        <a:ea typeface="Cambria Math" panose="02040503050406030204" pitchFamily="18" charset="0"/>
+                      </a:rPr>
+                      <m:t>−</m:t>
+                    </m:r>
+                    <m:r>
+                      <a:rPr lang="de-DE" i="1">
+                        <a:latin typeface="Cambria Math" panose="02040503050406030204" pitchFamily="18" charset="0"/>
+                        <a:ea typeface="Cambria Math" panose="02040503050406030204" pitchFamily="18" charset="0"/>
+                      </a:rPr>
+                      <m:t>180°</m:t>
+                    </m:r>
+                  </m:oMath>
+                </a14:m>
+                <a:endParaRPr lang="de-DE" dirty="0"/>
+              </a:p>
+              <a:p>
+                <a:pPr marL="0" indent="0">
+                  <a:buNone/>
+                </a:pPr>
+                <a:r>
+                  <a:rPr lang="de-DE" dirty="0" err="1"/>
+                  <a:t>Gain</a:t>
+                </a:r>
+                <a:r>
+                  <a:rPr lang="de-DE" dirty="0"/>
+                  <a:t> </a:t>
+                </a:r>
+                <a:r>
+                  <a:rPr lang="de-DE" dirty="0" err="1"/>
+                  <a:t>margin</a:t>
+                </a:r>
+                <a:r>
+                  <a:rPr lang="de-DE" dirty="0"/>
+                  <a:t>:</a:t>
+                </a:r>
+              </a:p>
+              <a:p>
+                <a:pPr marL="0" indent="0">
+                  <a:buNone/>
+                </a:pPr>
+                <a:r>
+                  <a:rPr lang="de-DE" dirty="0"/>
+                  <a:t>	</a:t>
+                </a:r>
+                <a14:m>
+                  <m:oMath xmlns:m="http://schemas.openxmlformats.org/officeDocument/2006/math">
+                    <m:r>
+                      <a:rPr lang="de-DE" i="1">
+                        <a:latin typeface="Cambria Math" panose="02040503050406030204" pitchFamily="18" charset="0"/>
+                      </a:rPr>
+                      <m:t>𝐺𝑀</m:t>
+                    </m:r>
+                    <m:r>
+                      <a:rPr lang="de-DE" i="1">
+                        <a:latin typeface="Cambria Math" panose="02040503050406030204" pitchFamily="18" charset="0"/>
+                      </a:rPr>
+                      <m:t>=</m:t>
+                    </m:r>
+                    <m:f>
+                      <m:fPr>
+                        <m:ctrlPr>
+                          <a:rPr lang="de-DE" i="1">
+                            <a:latin typeface="Cambria Math" panose="02040503050406030204" pitchFamily="18" charset="0"/>
+                          </a:rPr>
+                        </m:ctrlPr>
+                      </m:fPr>
+                      <m:num>
+                        <m:r>
+                          <a:rPr lang="de-DE" i="1">
+                            <a:latin typeface="Cambria Math" panose="02040503050406030204" pitchFamily="18" charset="0"/>
+                          </a:rPr>
+                          <m:t>1</m:t>
+                        </m:r>
+                      </m:num>
+                      <m:den>
+                        <m:d>
+                          <m:dPr>
+                            <m:begChr m:val="|"/>
+                            <m:endChr m:val="|"/>
+                            <m:ctrlPr>
+                              <a:rPr lang="de-DE" i="1">
+                                <a:latin typeface="Cambria Math" panose="02040503050406030204" pitchFamily="18" charset="0"/>
+                                <a:ea typeface="Cambria Math" panose="02040503050406030204" pitchFamily="18" charset="0"/>
+                              </a:rPr>
+                            </m:ctrlPr>
+                          </m:dPr>
+                          <m:e>
+                            <m:r>
+                              <a:rPr lang="de-DE" i="1">
+                                <a:latin typeface="Cambria Math" panose="02040503050406030204" pitchFamily="18" charset="0"/>
+                                <a:ea typeface="Cambria Math" panose="02040503050406030204" pitchFamily="18" charset="0"/>
+                              </a:rPr>
+                              <m:t>𝐿</m:t>
+                            </m:r>
+                            <m:d>
+                              <m:dPr>
+                                <m:ctrlPr>
+                                  <a:rPr lang="de-DE" i="1">
+                                    <a:latin typeface="Cambria Math" panose="02040503050406030204" pitchFamily="18" charset="0"/>
+                                  </a:rPr>
+                                </m:ctrlPr>
+                              </m:dPr>
+                              <m:e>
+                                <m:r>
+                                  <a:rPr lang="de-DE" i="1">
+                                    <a:latin typeface="Cambria Math" panose="02040503050406030204" pitchFamily="18" charset="0"/>
+                                  </a:rPr>
+                                  <m:t>𝑗</m:t>
+                                </m:r>
+                                <m:sSub>
+                                  <m:sSubPr>
+                                    <m:ctrlPr>
+                                      <a:rPr lang="de-DE" i="1">
+                                        <a:latin typeface="Cambria Math" panose="02040503050406030204" pitchFamily="18" charset="0"/>
+                                        <a:ea typeface="Cambria Math" panose="02040503050406030204" pitchFamily="18" charset="0"/>
+                                      </a:rPr>
+                                    </m:ctrlPr>
+                                  </m:sSubPr>
+                                  <m:e>
+                                    <m:r>
+                                      <a:rPr lang="de-DE" i="1">
+                                        <a:latin typeface="Cambria Math" panose="02040503050406030204" pitchFamily="18" charset="0"/>
+                                        <a:ea typeface="Cambria Math" panose="02040503050406030204" pitchFamily="18" charset="0"/>
+                                      </a:rPr>
+                                      <m:t>𝜔</m:t>
+                                    </m:r>
+                                  </m:e>
+                                  <m:sub>
+                                    <m:r>
+                                      <a:rPr lang="de-DE" i="1">
+                                        <a:latin typeface="Cambria Math" panose="02040503050406030204" pitchFamily="18" charset="0"/>
+                                        <a:ea typeface="Cambria Math" panose="02040503050406030204" pitchFamily="18" charset="0"/>
+                                      </a:rPr>
+                                      <m:t>𝑝</m:t>
+                                    </m:r>
+                                    <m:r>
+                                      <a:rPr lang="de-DE" i="1">
+                                        <a:latin typeface="Cambria Math" panose="02040503050406030204" pitchFamily="18" charset="0"/>
+                                        <a:ea typeface="Cambria Math" panose="02040503050406030204" pitchFamily="18" charset="0"/>
+                                      </a:rPr>
+                                      <m:t>𝑐</m:t>
+                                    </m:r>
+                                  </m:sub>
+                                </m:sSub>
+                              </m:e>
+                            </m:d>
+                          </m:e>
+                        </m:d>
+                      </m:den>
+                    </m:f>
+                  </m:oMath>
+                </a14:m>
+                <a:endParaRPr lang="de-DE" dirty="0"/>
+              </a:p>
+              <a:p>
+                <a:pPr marL="0" indent="0">
+                  <a:buNone/>
+                </a:pPr>
+                <a:endParaRPr lang="de-DE" dirty="0"/>
+              </a:p>
+              <a:p>
+                <a:pPr marL="0" indent="0">
+                  <a:buNone/>
+                </a:pPr>
+                <a:r>
+                  <a:rPr lang="de-DE" dirty="0" err="1"/>
+                  <a:t>Gain</a:t>
+                </a:r>
+                <a:r>
+                  <a:rPr lang="de-DE" dirty="0"/>
+                  <a:t> </a:t>
+                </a:r>
+                <a:r>
+                  <a:rPr lang="de-DE" dirty="0" err="1"/>
+                  <a:t>crossover</a:t>
+                </a:r>
+                <a:r>
+                  <a:rPr lang="de-DE" dirty="0"/>
+                  <a:t> </a:t>
+                </a:r>
+                <a:r>
+                  <a:rPr lang="de-DE" dirty="0" err="1"/>
+                  <a:t>frequency</a:t>
+                </a:r>
+                <a:r>
+                  <a:rPr lang="de-DE" dirty="0"/>
+                  <a:t>:</a:t>
+                </a:r>
+              </a:p>
+              <a:p>
+                <a:pPr marL="0" indent="0">
+                  <a:buNone/>
+                </a:pPr>
+                <a:r>
+                  <a:rPr lang="de-DE" dirty="0">
+                    <a:ea typeface="Cambria Math" panose="02040503050406030204" pitchFamily="18" charset="0"/>
+                  </a:rPr>
+                  <a:t>	</a:t>
+                </a:r>
+                <a14:m>
+                  <m:oMath xmlns:m="http://schemas.openxmlformats.org/officeDocument/2006/math">
+                    <m:d>
+                      <m:dPr>
+                        <m:begChr m:val="|"/>
+                        <m:endChr m:val="|"/>
+                        <m:ctrlPr>
+                          <a:rPr lang="de-DE" i="1">
+                            <a:latin typeface="Cambria Math" panose="02040503050406030204" pitchFamily="18" charset="0"/>
+                            <a:ea typeface="Cambria Math" panose="02040503050406030204" pitchFamily="18" charset="0"/>
+                          </a:rPr>
+                        </m:ctrlPr>
+                      </m:dPr>
+                      <m:e>
+                        <m:r>
+                          <a:rPr lang="de-DE" i="1">
+                            <a:latin typeface="Cambria Math" panose="02040503050406030204" pitchFamily="18" charset="0"/>
+                            <a:ea typeface="Cambria Math" panose="02040503050406030204" pitchFamily="18" charset="0"/>
+                          </a:rPr>
+                          <m:t>𝐿</m:t>
+                        </m:r>
+                        <m:d>
+                          <m:dPr>
+                            <m:ctrlPr>
+                              <a:rPr lang="de-DE" i="1">
+                                <a:latin typeface="Cambria Math" panose="02040503050406030204" pitchFamily="18" charset="0"/>
+                              </a:rPr>
+                            </m:ctrlPr>
+                          </m:dPr>
+                          <m:e>
+                            <m:r>
+                              <a:rPr lang="de-DE" i="1">
+                                <a:latin typeface="Cambria Math" panose="02040503050406030204" pitchFamily="18" charset="0"/>
+                              </a:rPr>
+                              <m:t>𝑗</m:t>
+                            </m:r>
+                            <m:sSub>
+                              <m:sSubPr>
+                                <m:ctrlPr>
+                                  <a:rPr lang="de-DE" i="1" smtClean="0">
+                                    <a:latin typeface="Cambria Math" panose="02040503050406030204" pitchFamily="18" charset="0"/>
+                                    <a:ea typeface="Cambria Math" panose="02040503050406030204" pitchFamily="18" charset="0"/>
+                                  </a:rPr>
+                                </m:ctrlPr>
+                              </m:sSubPr>
+                              <m:e>
+                                <m:r>
+                                  <a:rPr lang="de-DE" i="1" smtClean="0">
+                                    <a:latin typeface="Cambria Math" panose="02040503050406030204" pitchFamily="18" charset="0"/>
+                                    <a:ea typeface="Cambria Math" panose="02040503050406030204" pitchFamily="18" charset="0"/>
+                                  </a:rPr>
+                                  <m:t>𝜔</m:t>
+                                </m:r>
+                              </m:e>
+                              <m:sub>
+                                <m:r>
+                                  <a:rPr lang="de-DE" b="0" i="1" smtClean="0">
+                                    <a:latin typeface="Cambria Math" panose="02040503050406030204" pitchFamily="18" charset="0"/>
+                                    <a:ea typeface="Cambria Math" panose="02040503050406030204" pitchFamily="18" charset="0"/>
+                                  </a:rPr>
+                                  <m:t>𝑔𝑐</m:t>
+                                </m:r>
+                              </m:sub>
+                            </m:sSub>
+                          </m:e>
+                        </m:d>
+                      </m:e>
+                    </m:d>
+                    <m:r>
+                      <a:rPr lang="de-DE" i="1">
+                        <a:latin typeface="Cambria Math" panose="02040503050406030204" pitchFamily="18" charset="0"/>
+                        <a:ea typeface="Cambria Math" panose="02040503050406030204" pitchFamily="18" charset="0"/>
+                      </a:rPr>
+                      <m:t>=1</m:t>
+                    </m:r>
+                  </m:oMath>
+                </a14:m>
+                <a:endParaRPr lang="de-DE" dirty="0"/>
+              </a:p>
+              <a:p>
+                <a:pPr marL="0" indent="0">
+                  <a:buNone/>
+                </a:pPr>
+                <a:r>
+                  <a:rPr lang="de-DE" dirty="0"/>
+                  <a:t>Phase </a:t>
+                </a:r>
+                <a:r>
+                  <a:rPr lang="de-DE" dirty="0" err="1"/>
+                  <a:t>margin</a:t>
+                </a:r>
+                <a:r>
+                  <a:rPr lang="de-DE" dirty="0"/>
+                  <a:t>:</a:t>
+                </a:r>
+              </a:p>
+              <a:p>
+                <a:pPr marL="0" indent="0">
+                  <a:buNone/>
+                </a:pPr>
+                <a:r>
+                  <a:rPr lang="de-DE" b="0" dirty="0">
+                    <a:ea typeface="Cambria Math" panose="02040503050406030204" pitchFamily="18" charset="0"/>
+                  </a:rPr>
+                  <a:t>	</a:t>
+                </a:r>
+                <a14:m>
+                  <m:oMath xmlns:m="http://schemas.openxmlformats.org/officeDocument/2006/math">
+                    <m:r>
+                      <a:rPr lang="de-DE" b="0" i="1" smtClean="0">
+                        <a:latin typeface="Cambria Math" panose="02040503050406030204" pitchFamily="18" charset="0"/>
+                        <a:ea typeface="Cambria Math" panose="02040503050406030204" pitchFamily="18" charset="0"/>
+                      </a:rPr>
+                      <m:t>𝑃𝑀</m:t>
+                    </m:r>
+                    <m:r>
+                      <a:rPr lang="de-DE" b="0" i="0" smtClean="0">
+                        <a:latin typeface="Cambria Math" panose="02040503050406030204" pitchFamily="18" charset="0"/>
+                        <a:ea typeface="Cambria Math" panose="02040503050406030204" pitchFamily="18" charset="0"/>
+                      </a:rPr>
+                      <m:t>=</m:t>
+                    </m:r>
+                    <m:r>
+                      <a:rPr lang="de-DE" i="1">
+                        <a:latin typeface="Cambria Math" panose="02040503050406030204" pitchFamily="18" charset="0"/>
+                        <a:ea typeface="Cambria Math" panose="02040503050406030204" pitchFamily="18" charset="0"/>
+                      </a:rPr>
+                      <m:t>180°</m:t>
+                    </m:r>
+                    <m:r>
+                      <a:rPr lang="de-DE" b="0" i="1" smtClean="0">
+                        <a:latin typeface="Cambria Math" panose="02040503050406030204" pitchFamily="18" charset="0"/>
+                        <a:ea typeface="Cambria Math" panose="02040503050406030204" pitchFamily="18" charset="0"/>
+                      </a:rPr>
+                      <m:t>+</m:t>
+                    </m:r>
+                    <m:r>
+                      <a:rPr lang="de-DE" i="1">
+                        <a:latin typeface="Cambria Math" panose="02040503050406030204" pitchFamily="18" charset="0"/>
+                        <a:ea typeface="Cambria Math" panose="02040503050406030204" pitchFamily="18" charset="0"/>
+                      </a:rPr>
+                      <m:t>∠</m:t>
+                    </m:r>
+                    <m:r>
+                      <a:rPr lang="de-DE" i="1">
+                        <a:latin typeface="Cambria Math" panose="02040503050406030204" pitchFamily="18" charset="0"/>
+                        <a:ea typeface="Cambria Math" panose="02040503050406030204" pitchFamily="18" charset="0"/>
+                      </a:rPr>
+                      <m:t>𝐿</m:t>
+                    </m:r>
+                    <m:d>
+                      <m:dPr>
+                        <m:ctrlPr>
+                          <a:rPr lang="de-DE" i="1">
+                            <a:latin typeface="Cambria Math" panose="02040503050406030204" pitchFamily="18" charset="0"/>
+                          </a:rPr>
+                        </m:ctrlPr>
+                      </m:dPr>
+                      <m:e>
+                        <m:r>
+                          <a:rPr lang="de-DE" i="1">
+                            <a:latin typeface="Cambria Math" panose="02040503050406030204" pitchFamily="18" charset="0"/>
+                          </a:rPr>
+                          <m:t>𝑗</m:t>
+                        </m:r>
+                        <m:sSub>
+                          <m:sSubPr>
+                            <m:ctrlPr>
+                              <a:rPr lang="de-DE" i="1">
+                                <a:latin typeface="Cambria Math" panose="02040503050406030204" pitchFamily="18" charset="0"/>
+                                <a:ea typeface="Cambria Math" panose="02040503050406030204" pitchFamily="18" charset="0"/>
+                              </a:rPr>
+                            </m:ctrlPr>
+                          </m:sSubPr>
+                          <m:e>
+                            <m:r>
+                              <a:rPr lang="de-DE" i="1">
+                                <a:latin typeface="Cambria Math" panose="02040503050406030204" pitchFamily="18" charset="0"/>
+                                <a:ea typeface="Cambria Math" panose="02040503050406030204" pitchFamily="18" charset="0"/>
+                              </a:rPr>
+                              <m:t>𝜔</m:t>
+                            </m:r>
+                          </m:e>
+                          <m:sub>
+                            <m:r>
+                              <a:rPr lang="de-DE" i="1">
+                                <a:latin typeface="Cambria Math" panose="02040503050406030204" pitchFamily="18" charset="0"/>
+                                <a:ea typeface="Cambria Math" panose="02040503050406030204" pitchFamily="18" charset="0"/>
+                              </a:rPr>
+                              <m:t>𝑔𝑐</m:t>
+                            </m:r>
+                          </m:sub>
+                        </m:sSub>
+                      </m:e>
+                    </m:d>
+                  </m:oMath>
+                </a14:m>
+                <a:endParaRPr lang="de-DE" dirty="0"/>
+              </a:p>
+              <a:p>
+                <a:pPr marL="0" indent="0">
+                  <a:buNone/>
+                </a:pPr>
+                <a:endParaRPr lang="de-DE" dirty="0"/>
+              </a:p>
+            </p:txBody>
+          </p:sp>
+        </mc:Choice>
+        <mc:Fallback>
+          <p:sp>
+            <p:nvSpPr>
+              <p:cNvPr id="3" name="Inhaltsplatzhalter 2">
+                <a:extLst>
+                  <a:ext uri="{FF2B5EF4-FFF2-40B4-BE49-F238E27FC236}">
+                    <a16:creationId xmlns:a16="http://schemas.microsoft.com/office/drawing/2014/main" id="{07BA2F6C-A63D-4870-28C6-4BE78A35D9B6}"/>
+                  </a:ext>
+                </a:extLst>
+              </p:cNvPr>
+              <p:cNvSpPr>
+                <a:spLocks noGrp="1" noRot="1" noChangeAspect="1" noMove="1" noResize="1" noEditPoints="1" noAdjustHandles="1" noChangeArrowheads="1" noChangeShapeType="1" noTextEdit="1"/>
+              </p:cNvSpPr>
+              <p:nvPr>
+                <p:ph idx="1"/>
+              </p:nvPr>
+            </p:nvSpPr>
+            <p:spPr>
+              <a:blipFill>
+                <a:blip r:embed="rId2"/>
+                <a:stretch>
+                  <a:fillRect l="-1086" t="-2616" b="-1163"/>
+                </a:stretch>
+              </a:blipFill>
+            </p:spPr>
+            <p:txBody>
+              <a:bodyPr/>
+              <a:lstStyle/>
+              <a:p>
+                <a:r>
+                  <a:rPr lang="de-DE">
+                    <a:noFill/>
+                  </a:rPr>
+                  <a:t> </a:t>
+                </a:r>
+              </a:p>
+            </p:txBody>
+          </p:sp>
+        </mc:Fallback>
+      </mc:AlternateContent>
+      <p:sp>
+        <p:nvSpPr>
+          <p:cNvPr id="4" name="Foliennummernplatzhalter 3">
+            <a:extLst>
+              <a:ext uri="{FF2B5EF4-FFF2-40B4-BE49-F238E27FC236}">
+                <a16:creationId xmlns:a16="http://schemas.microsoft.com/office/drawing/2014/main" id="{A4AABD63-47D9-6DAA-DBC5-4FF4463915CD}"/>
+              </a:ext>
+            </a:extLst>
+          </p:cNvPr>
+          <p:cNvSpPr>
+            <a:spLocks noGrp="1"/>
+          </p:cNvSpPr>
+          <p:nvPr>
+            <p:ph type="sldNum" sz="quarter" idx="12"/>
+          </p:nvPr>
+        </p:nvSpPr>
+        <p:spPr/>
+        <p:txBody>
+          <a:bodyPr/>
+          <a:lstStyle/>
+          <a:p>
+            <a:fld id="{08C366F5-AFAD-49CB-854A-9D9E238FCA13}" type="slidenum">
+              <a:rPr lang="en-GB" smtClean="0"/>
+              <a:t>21</a:t>
+            </a:fld>
+            <a:endParaRPr lang="en-GB"/>
+          </a:p>
+        </p:txBody>
+      </p:sp>
+      <p:pic>
+        <p:nvPicPr>
+          <p:cNvPr id="5" name="Grafik 4">
+            <a:extLst>
+              <a:ext uri="{FF2B5EF4-FFF2-40B4-BE49-F238E27FC236}">
+                <a16:creationId xmlns:a16="http://schemas.microsoft.com/office/drawing/2014/main" id="{2413211B-6B0F-D6B5-2986-85580905E851}"/>
+              </a:ext>
+            </a:extLst>
+          </p:cNvPr>
+          <p:cNvPicPr>
+            <a:picLocks noChangeAspect="1"/>
+          </p:cNvPicPr>
+          <p:nvPr/>
+        </p:nvPicPr>
+        <p:blipFill>
+          <a:blip r:embed="rId3"/>
+          <a:stretch>
+            <a:fillRect/>
+          </a:stretch>
+        </p:blipFill>
+        <p:spPr>
+          <a:xfrm>
+            <a:off x="5342494" y="1825625"/>
+            <a:ext cx="6849506" cy="4227305"/>
+          </a:xfrm>
+          <a:prstGeom prst="rect">
+            <a:avLst/>
+          </a:prstGeom>
+        </p:spPr>
+      </p:pic>
+      <p:sp>
+        <p:nvSpPr>
+          <p:cNvPr id="7" name="Textfeld 6">
+            <a:extLst>
+              <a:ext uri="{FF2B5EF4-FFF2-40B4-BE49-F238E27FC236}">
+                <a16:creationId xmlns:a16="http://schemas.microsoft.com/office/drawing/2014/main" id="{71728122-EEA6-FB12-AC4A-3F62F7695D8D}"/>
+              </a:ext>
+            </a:extLst>
+          </p:cNvPr>
+          <p:cNvSpPr txBox="1"/>
+          <p:nvPr/>
+        </p:nvSpPr>
+        <p:spPr>
+          <a:xfrm>
+            <a:off x="8458201" y="1332260"/>
+            <a:ext cx="1944443" cy="369332"/>
+          </a:xfrm>
+          <a:prstGeom prst="rect">
+            <a:avLst/>
+          </a:prstGeom>
+          <a:noFill/>
+        </p:spPr>
+        <p:txBody>
+          <a:bodyPr wrap="none" rtlCol="0">
+            <a:spAutoFit/>
+          </a:bodyPr>
+          <a:lstStyle/>
+          <a:p>
+            <a:r>
+              <a:rPr lang="de-DE" dirty="0"/>
+              <a:t>just </a:t>
+            </a:r>
+            <a:r>
+              <a:rPr lang="de-DE" dirty="0" err="1"/>
+              <a:t>barely</a:t>
+            </a:r>
+            <a:r>
+              <a:rPr lang="de-DE" dirty="0"/>
+              <a:t> </a:t>
+            </a:r>
+            <a:r>
+              <a:rPr lang="de-DE" dirty="0" err="1"/>
+              <a:t>stable</a:t>
+            </a:r>
+            <a:r>
+              <a:rPr lang="de-DE" dirty="0"/>
+              <a:t>:</a:t>
+            </a:r>
+          </a:p>
+        </p:txBody>
+      </p:sp>
+    </p:spTree>
+    <p:extLst>
+      <p:ext uri="{BB962C8B-B14F-4D97-AF65-F5344CB8AC3E}">
+        <p14:creationId xmlns:p14="http://schemas.microsoft.com/office/powerpoint/2010/main" val="2178820404"/>
       </p:ext>
     </p:extLst>
   </p:cSld>

</xml_diff>